<commit_message>
Checkpoint. Queues diagram mostly done.
</commit_message>
<xml_diff>
--- a/figures/prompt_queues_1.pptx
+++ b/figures/prompt_queues_1.pptx
@@ -7,7 +7,7 @@
   <p:sldIdLst>
     <p:sldId id="256" r:id="rId3"/>
   </p:sldIdLst>
-  <p:sldSz cx="12192000" cy="6858000"/>
+  <p:sldSz cx="10972800" cy="6858000"/>
   <p:notesSz cx="7103745" cy="10234295"/>
   <p:defaultTextStyle>
     <a:defPPr>
@@ -136,8 +136,8 @@
         </p:nvSpPr>
         <p:spPr>
           <a:xfrm>
-            <a:off x="1524000" y="1122363"/>
-            <a:ext cx="9144000" cy="2387600"/>
+            <a:off x="1371610" y="1122371"/>
+            <a:ext cx="8229660" cy="2387617"/>
           </a:xfrm>
         </p:spPr>
         <p:txBody>
@@ -168,8 +168,8 @@
         </p:nvSpPr>
         <p:spPr>
           <a:xfrm>
-            <a:off x="1524000" y="3602038"/>
-            <a:ext cx="9144000" cy="1655762"/>
+            <a:off x="1371610" y="3602064"/>
+            <a:ext cx="8229660" cy="1655774"/>
           </a:xfrm>
         </p:spPr>
         <p:txBody>
@@ -321,8 +321,8 @@
         </p:nvSpPr>
         <p:spPr>
           <a:xfrm>
-            <a:off x="838200" y="365125"/>
-            <a:ext cx="10515600" cy="5811838"/>
+            <a:off x="754386" y="365128"/>
+            <a:ext cx="9464110" cy="5811881"/>
           </a:xfrm>
         </p:spPr>
         <p:txBody>
@@ -637,8 +637,8 @@
         </p:nvSpPr>
         <p:spPr>
           <a:xfrm>
-            <a:off x="831850" y="1709738"/>
-            <a:ext cx="10515600" cy="2852737"/>
+            <a:off x="748671" y="1709751"/>
+            <a:ext cx="9464110" cy="2852758"/>
           </a:xfrm>
         </p:spPr>
         <p:txBody>
@@ -669,8 +669,8 @@
         </p:nvSpPr>
         <p:spPr>
           <a:xfrm>
-            <a:off x="831850" y="4589463"/>
-            <a:ext cx="10515600" cy="1500187"/>
+            <a:off x="748671" y="4589497"/>
+            <a:ext cx="9464110" cy="1500198"/>
           </a:xfrm>
         </p:spPr>
         <p:txBody>
@@ -900,8 +900,8 @@
         </p:nvSpPr>
         <p:spPr>
           <a:xfrm>
-            <a:off x="838200" y="1825625"/>
-            <a:ext cx="5181600" cy="4351338"/>
+            <a:off x="754386" y="1825638"/>
+            <a:ext cx="4663474" cy="4351370"/>
           </a:xfrm>
         </p:spPr>
         <p:txBody>
@@ -961,8 +961,8 @@
         </p:nvSpPr>
         <p:spPr>
           <a:xfrm>
-            <a:off x="6172200" y="1825625"/>
-            <a:ext cx="5181600" cy="4351338"/>
+            <a:off x="5555021" y="1825638"/>
+            <a:ext cx="4663474" cy="4351370"/>
           </a:xfrm>
         </p:spPr>
         <p:txBody>
@@ -1110,8 +1110,8 @@
         </p:nvSpPr>
         <p:spPr>
           <a:xfrm>
-            <a:off x="839788" y="365125"/>
-            <a:ext cx="10515600" cy="1325563"/>
+            <a:off x="755815" y="365128"/>
+            <a:ext cx="9464110" cy="1325573"/>
           </a:xfrm>
         </p:spPr>
         <p:txBody>
@@ -1138,8 +1138,8 @@
         </p:nvSpPr>
         <p:spPr>
           <a:xfrm>
-            <a:off x="839788" y="1681163"/>
-            <a:ext cx="5157787" cy="823912"/>
+            <a:off x="755815" y="1681175"/>
+            <a:ext cx="4642042" cy="823918"/>
           </a:xfrm>
         </p:spPr>
         <p:txBody>
@@ -1204,8 +1204,8 @@
         </p:nvSpPr>
         <p:spPr>
           <a:xfrm>
-            <a:off x="839788" y="2505075"/>
-            <a:ext cx="5157787" cy="3684588"/>
+            <a:off x="755815" y="2505093"/>
+            <a:ext cx="4642042" cy="3684615"/>
           </a:xfrm>
         </p:spPr>
         <p:txBody>
@@ -1265,8 +1265,8 @@
         </p:nvSpPr>
         <p:spPr>
           <a:xfrm>
-            <a:off x="6172200" y="1681163"/>
-            <a:ext cx="5183188" cy="823912"/>
+            <a:off x="5555021" y="1681175"/>
+            <a:ext cx="4664903" cy="823918"/>
           </a:xfrm>
         </p:spPr>
         <p:txBody>
@@ -1331,8 +1331,8 @@
         </p:nvSpPr>
         <p:spPr>
           <a:xfrm>
-            <a:off x="6172200" y="2505075"/>
-            <a:ext cx="5183188" cy="3684588"/>
+            <a:off x="5555021" y="2505093"/>
+            <a:ext cx="4664903" cy="3684615"/>
           </a:xfrm>
         </p:spPr>
         <p:txBody>
@@ -1679,8 +1679,8 @@
         </p:nvSpPr>
         <p:spPr>
           <a:xfrm>
-            <a:off x="839788" y="457200"/>
-            <a:ext cx="3932237" cy="1600200"/>
+            <a:off x="755815" y="457203"/>
+            <a:ext cx="3539039" cy="1600212"/>
           </a:xfrm>
         </p:spPr>
         <p:txBody>
@@ -1711,8 +1711,8 @@
         </p:nvSpPr>
         <p:spPr>
           <a:xfrm>
-            <a:off x="5183188" y="987425"/>
-            <a:ext cx="6172200" cy="4873625"/>
+            <a:off x="4664903" y="987432"/>
+            <a:ext cx="5555021" cy="4873661"/>
           </a:xfrm>
         </p:spPr>
         <p:txBody>
@@ -1772,8 +1772,8 @@
         </p:nvSpPr>
         <p:spPr>
           <a:xfrm>
-            <a:off x="839788" y="2057400"/>
-            <a:ext cx="3932237" cy="3811588"/>
+            <a:off x="755815" y="2057415"/>
+            <a:ext cx="3539039" cy="3811616"/>
           </a:xfrm>
         </p:spPr>
         <p:txBody>
@@ -1933,8 +1933,8 @@
         </p:nvSpPr>
         <p:spPr>
           <a:xfrm>
-            <a:off x="8724900" y="365125"/>
-            <a:ext cx="2628900" cy="5811838"/>
+            <a:off x="7852468" y="365128"/>
+            <a:ext cx="2366027" cy="5811881"/>
           </a:xfrm>
         </p:spPr>
         <p:txBody>
@@ -1961,8 +1961,8 @@
         </p:nvSpPr>
         <p:spPr>
           <a:xfrm>
-            <a:off x="838200" y="365125"/>
-            <a:ext cx="7734300" cy="5811838"/>
+            <a:off x="754386" y="365128"/>
+            <a:ext cx="6960921" cy="5811881"/>
           </a:xfrm>
         </p:spPr>
         <p:txBody>
@@ -2115,8 +2115,8 @@
         </p:nvSpPr>
         <p:spPr>
           <a:xfrm>
-            <a:off x="838200" y="365125"/>
-            <a:ext cx="10515600" cy="1325563"/>
+            <a:off x="754386" y="365128"/>
+            <a:ext cx="9464110" cy="1325573"/>
           </a:xfrm>
           <a:prstGeom prst="rect">
             <a:avLst/>
@@ -2148,8 +2148,8 @@
         </p:nvSpPr>
         <p:spPr>
           <a:xfrm>
-            <a:off x="838200" y="1825625"/>
-            <a:ext cx="10515600" cy="4351338"/>
+            <a:off x="754386" y="1825638"/>
+            <a:ext cx="9464110" cy="4351370"/>
           </a:xfrm>
           <a:prstGeom prst="rect">
             <a:avLst/>
@@ -2214,8 +2214,8 @@
         </p:nvSpPr>
         <p:spPr>
           <a:xfrm>
-            <a:off x="838200" y="6356350"/>
-            <a:ext cx="2743200" cy="365125"/>
+            <a:off x="754386" y="6356397"/>
+            <a:ext cx="2468898" cy="365128"/>
           </a:xfrm>
           <a:prstGeom prst="rect">
             <a:avLst/>
@@ -2254,8 +2254,8 @@
         </p:nvSpPr>
         <p:spPr>
           <a:xfrm>
-            <a:off x="4038600" y="6356350"/>
-            <a:ext cx="4114800" cy="365125"/>
+            <a:off x="3634767" y="6356397"/>
+            <a:ext cx="3703347" cy="365128"/>
           </a:xfrm>
           <a:prstGeom prst="rect">
             <a:avLst/>
@@ -2291,8 +2291,8 @@
         </p:nvSpPr>
         <p:spPr>
           <a:xfrm>
-            <a:off x="8610600" y="6356350"/>
-            <a:ext cx="2743200" cy="365125"/>
+            <a:off x="7749597" y="6356397"/>
+            <a:ext cx="2468898" cy="365128"/>
           </a:xfrm>
           <a:prstGeom prst="rect">
             <a:avLst/>
@@ -2634,7 +2634,7 @@
           <p:nvPr/>
         </p:nvGraphicFramePr>
         <p:xfrm>
-          <a:off x="1603375" y="1004570"/>
+          <a:off x="635040" y="996340"/>
           <a:ext cx="2761615" cy="5508625"/>
         </p:xfrm>
         <a:graphic>
@@ -2657,28 +2657,28 @@
                         <a:buNone/>
                       </a:pPr>
                       <a:r>
-                        <a:rPr lang="en-US" sz="1600"/>
+                        <a:rPr lang="en-US" sz="1800"/>
                         <a:t>Input</a:t>
                       </a:r>
-                      <a:endParaRPr lang="en-US" sz="1600"/>
-                    </a:p>
-                  </a:txBody>
-                  <a:tcPr/>
-                </a:tc>
-                <a:tc>
-                  <a:txBody>
-                    <a:bodyPr/>
-                    <a:p>
-                      <a:pPr algn="ctr">
-                        <a:buNone/>
-                      </a:pPr>
-                      <a:r>
-                        <a:rPr lang="en-US" sz="1600">
+                      <a:endParaRPr lang="en-US" sz="1800"/>
+                    </a:p>
+                  </a:txBody>
+                  <a:tcPr/>
+                </a:tc>
+                <a:tc>
+                  <a:txBody>
+                    <a:bodyPr/>
+                    <a:p>
+                      <a:pPr algn="ctr">
+                        <a:buNone/>
+                      </a:pPr>
+                      <a:r>
+                        <a:rPr lang="en-US" sz="1800">
                           <a:sym typeface="+mn-ea"/>
                         </a:rPr>
                         <a:t>Output</a:t>
                       </a:r>
-                      <a:endParaRPr lang="en-US" sz="1600">
+                      <a:endParaRPr lang="en-US" sz="1800">
                         <a:sym typeface="+mn-ea"/>
                       </a:endParaRPr>
                     </a:p>
@@ -2693,10 +2693,10 @@
                         <a:buNone/>
                       </a:pPr>
                       <a:r>
-                        <a:rPr lang="en-US" sz="1600"/>
+                        <a:rPr lang="en-US" sz="1800"/>
                         <a:t>State</a:t>
                       </a:r>
-                      <a:endParaRPr lang="en-US" sz="1600"/>
+                      <a:endParaRPr lang="en-US" sz="1800"/>
                     </a:p>
                   </a:txBody>
                   <a:tcPr/>
@@ -2707,34 +2707,62 @@
                   <a:txBody>
                     <a:bodyPr/>
                     <a:p>
-                      <a:pPr>
-                        <a:buNone/>
-                      </a:pPr>
-                      <a:endParaRPr lang="en-US"/>
-                    </a:p>
-                  </a:txBody>
-                  <a:tcPr/>
-                </a:tc>
-                <a:tc>
-                  <a:txBody>
-                    <a:bodyPr/>
-                    <a:p>
-                      <a:pPr>
-                        <a:buNone/>
-                      </a:pPr>
-                      <a:endParaRPr lang="en-US"/>
-                    </a:p>
-                  </a:txBody>
-                  <a:tcPr/>
-                </a:tc>
-                <a:tc>
-                  <a:txBody>
-                    <a:bodyPr/>
-                    <a:p>
-                      <a:pPr>
-                        <a:buNone/>
-                      </a:pPr>
-                      <a:endParaRPr lang="en-US"/>
+                      <a:pPr algn="ctr">
+                        <a:buNone/>
+                      </a:pPr>
+                      <a:r>
+                        <a:rPr lang="en-US" altLang="ru-RU" sz="1800"/>
+                        <a:t>I</a:t>
+                      </a:r>
+                      <a:r>
+                        <a:rPr lang="en-US" altLang="ru-RU" sz="1800" baseline="-25000"/>
+                        <a:t>11</a:t>
+                      </a:r>
+                      <a:endParaRPr lang="en-US" altLang="ru-RU" sz="1800" baseline="-25000"/>
+                    </a:p>
+                  </a:txBody>
+                  <a:tcPr/>
+                </a:tc>
+                <a:tc>
+                  <a:txBody>
+                    <a:bodyPr/>
+                    <a:p>
+                      <a:pPr algn="ctr">
+                        <a:buNone/>
+                      </a:pPr>
+                      <a:r>
+                        <a:rPr lang="en-US" sz="1800"/>
+                        <a:t>O</a:t>
+                      </a:r>
+                      <a:r>
+                        <a:rPr lang="en-US" sz="1800" baseline="-25000"/>
+                        <a:t>11</a:t>
+                      </a:r>
+                      <a:endParaRPr lang="en-US" sz="1800" baseline="-25000"/>
+                    </a:p>
+                  </a:txBody>
+                  <a:tcPr/>
+                </a:tc>
+                <a:tc>
+                  <a:txBody>
+                    <a:bodyPr/>
+                    <a:p>
+                      <a:pPr algn="ctr">
+                        <a:buNone/>
+                      </a:pPr>
+                      <a:r>
+                        <a:rPr lang="en-US" sz="1800">
+                          <a:sym typeface="+mn-ea"/>
+                        </a:rPr>
+                        <a:t>S</a:t>
+                      </a:r>
+                      <a:r>
+                        <a:rPr lang="en-US" sz="1800" baseline="-25000">
+                          <a:sym typeface="+mn-ea"/>
+                        </a:rPr>
+                        <a:t>11</a:t>
+                      </a:r>
+                      <a:endParaRPr lang="en-US" sz="1800"/>
                     </a:p>
                   </a:txBody>
                   <a:tcPr/>
@@ -2745,34 +2773,74 @@
                   <a:txBody>
                     <a:bodyPr/>
                     <a:p>
-                      <a:pPr>
-                        <a:buNone/>
-                      </a:pPr>
-                      <a:endParaRPr lang="en-US"/>
-                    </a:p>
-                  </a:txBody>
-                  <a:tcPr/>
-                </a:tc>
-                <a:tc>
-                  <a:txBody>
-                    <a:bodyPr/>
-                    <a:p>
-                      <a:pPr>
-                        <a:buNone/>
-                      </a:pPr>
-                      <a:endParaRPr lang="en-US"/>
-                    </a:p>
-                  </a:txBody>
-                  <a:tcPr/>
-                </a:tc>
-                <a:tc>
-                  <a:txBody>
-                    <a:bodyPr/>
-                    <a:p>
-                      <a:pPr>
-                        <a:buNone/>
-                      </a:pPr>
-                      <a:endParaRPr lang="en-US"/>
+                      <a:pPr algn="ctr">
+                        <a:buNone/>
+                      </a:pPr>
+                      <a:r>
+                        <a:rPr lang="en-US" altLang="ru-RU" sz="1800">
+                          <a:sym typeface="+mn-ea"/>
+                        </a:rPr>
+                        <a:t>I</a:t>
+                      </a:r>
+                      <a:r>
+                        <a:rPr lang="en-US" altLang="ru-RU" sz="1800" baseline="-25000">
+                          <a:sym typeface="+mn-ea"/>
+                        </a:rPr>
+                        <a:t>12</a:t>
+                      </a:r>
+                      <a:endParaRPr lang="en-US" altLang="ru-RU" sz="1800">
+                        <a:sym typeface="+mn-ea"/>
+                      </a:endParaRPr>
+                    </a:p>
+                  </a:txBody>
+                  <a:tcPr/>
+                </a:tc>
+                <a:tc>
+                  <a:txBody>
+                    <a:bodyPr/>
+                    <a:p>
+                      <a:pPr algn="ctr">
+                        <a:buNone/>
+                      </a:pPr>
+                      <a:r>
+                        <a:rPr lang="en-US" altLang="ru-RU" sz="1800">
+                          <a:sym typeface="+mn-ea"/>
+                        </a:rPr>
+                        <a:t>O</a:t>
+                      </a:r>
+                      <a:r>
+                        <a:rPr lang="en-US" altLang="ru-RU" sz="1800" baseline="-25000">
+                          <a:sym typeface="+mn-ea"/>
+                        </a:rPr>
+                        <a:t>12</a:t>
+                      </a:r>
+                      <a:endParaRPr lang="en-US" altLang="ru-RU" sz="1800" baseline="-25000">
+                        <a:sym typeface="+mn-ea"/>
+                      </a:endParaRPr>
+                    </a:p>
+                  </a:txBody>
+                  <a:tcPr/>
+                </a:tc>
+                <a:tc>
+                  <a:txBody>
+                    <a:bodyPr/>
+                    <a:p>
+                      <a:pPr algn="ctr">
+                        <a:buNone/>
+                      </a:pPr>
+                      <a:r>
+                        <a:rPr lang="en-US" sz="1800">
+                          <a:sym typeface="+mn-ea"/>
+                        </a:rPr>
+                        <a:t>S</a:t>
+                      </a:r>
+                      <a:r>
+                        <a:rPr lang="en-US" sz="1800" baseline="-25000">
+                          <a:sym typeface="+mn-ea"/>
+                        </a:rPr>
+                        <a:t>12</a:t>
+                      </a:r>
+                      <a:endParaRPr lang="en-US" sz="1800"/>
                     </a:p>
                   </a:txBody>
                   <a:tcPr/>
@@ -2783,34 +2851,42 @@
                   <a:txBody>
                     <a:bodyPr/>
                     <a:p>
+                      <a:pPr algn="ctr">
+                        <a:buNone/>
+                      </a:pPr>
+                      <a:r>
+                        <a:rPr lang="en-US" sz="1800"/>
+                        <a:t>...</a:t>
+                      </a:r>
+                      <a:endParaRPr lang="en-US" sz="1800"/>
+                    </a:p>
+                  </a:txBody>
+                  <a:tcPr/>
+                </a:tc>
+                <a:tc>
+                  <a:txBody>
+                    <a:bodyPr/>
+                    <a:p>
+                      <a:pPr algn="ctr">
+                        <a:buNone/>
+                      </a:pPr>
+                      <a:r>
+                        <a:rPr lang="en-US" sz="1800"/>
+                        <a:t>...</a:t>
+                      </a:r>
+                      <a:endParaRPr lang="en-US" sz="1800"/>
+                    </a:p>
+                  </a:txBody>
+                  <a:tcPr/>
+                </a:tc>
+                <a:tc>
+                  <a:txBody>
+                    <a:bodyPr/>
+                    <a:p>
                       <a:pPr>
                         <a:buNone/>
                       </a:pPr>
-                      <a:endParaRPr lang="en-US"/>
-                    </a:p>
-                  </a:txBody>
-                  <a:tcPr/>
-                </a:tc>
-                <a:tc>
-                  <a:txBody>
-                    <a:bodyPr/>
-                    <a:p>
-                      <a:pPr>
-                        <a:buNone/>
-                      </a:pPr>
-                      <a:endParaRPr lang="en-US"/>
-                    </a:p>
-                  </a:txBody>
-                  <a:tcPr/>
-                </a:tc>
-                <a:tc>
-                  <a:txBody>
-                    <a:bodyPr/>
-                    <a:p>
-                      <a:pPr>
-                        <a:buNone/>
-                      </a:pPr>
-                      <a:endParaRPr lang="en-US"/>
+                      <a:endParaRPr lang="en-US" sz="1800"/>
                     </a:p>
                   </a:txBody>
                   <a:tcPr/>
@@ -2821,34 +2897,42 @@
                   <a:txBody>
                     <a:bodyPr/>
                     <a:p>
+                      <a:pPr algn="ctr">
+                        <a:buNone/>
+                      </a:pPr>
+                      <a:r>
+                        <a:rPr lang="en-US" sz="1800"/>
+                        <a:t>...</a:t>
+                      </a:r>
+                      <a:endParaRPr lang="en-US" sz="1800"/>
+                    </a:p>
+                  </a:txBody>
+                  <a:tcPr/>
+                </a:tc>
+                <a:tc>
+                  <a:txBody>
+                    <a:bodyPr/>
+                    <a:p>
+                      <a:pPr algn="ctr">
+                        <a:buNone/>
+                      </a:pPr>
+                      <a:r>
+                        <a:rPr lang="en-US" sz="1800"/>
+                        <a:t>...</a:t>
+                      </a:r>
+                      <a:endParaRPr lang="en-US" sz="1800"/>
+                    </a:p>
+                  </a:txBody>
+                  <a:tcPr/>
+                </a:tc>
+                <a:tc>
+                  <a:txBody>
+                    <a:bodyPr/>
+                    <a:p>
                       <a:pPr>
                         <a:buNone/>
                       </a:pPr>
-                      <a:endParaRPr lang="en-US"/>
-                    </a:p>
-                  </a:txBody>
-                  <a:tcPr/>
-                </a:tc>
-                <a:tc>
-                  <a:txBody>
-                    <a:bodyPr/>
-                    <a:p>
-                      <a:pPr>
-                        <a:buNone/>
-                      </a:pPr>
-                      <a:endParaRPr lang="en-US"/>
-                    </a:p>
-                  </a:txBody>
-                  <a:tcPr/>
-                </a:tc>
-                <a:tc>
-                  <a:txBody>
-                    <a:bodyPr/>
-                    <a:p>
-                      <a:pPr>
-                        <a:buNone/>
-                      </a:pPr>
-                      <a:endParaRPr lang="en-US"/>
+                      <a:endParaRPr lang="en-US" sz="1800"/>
                     </a:p>
                   </a:txBody>
                   <a:tcPr/>
@@ -2859,34 +2943,42 @@
                   <a:txBody>
                     <a:bodyPr/>
                     <a:p>
+                      <a:pPr algn="ctr">
+                        <a:buNone/>
+                      </a:pPr>
+                      <a:r>
+                        <a:rPr lang="en-US" sz="1800"/>
+                        <a:t>...</a:t>
+                      </a:r>
+                      <a:endParaRPr lang="en-US" sz="1800"/>
+                    </a:p>
+                  </a:txBody>
+                  <a:tcPr/>
+                </a:tc>
+                <a:tc>
+                  <a:txBody>
+                    <a:bodyPr/>
+                    <a:p>
+                      <a:pPr algn="ctr">
+                        <a:buNone/>
+                      </a:pPr>
+                      <a:r>
+                        <a:rPr lang="en-US" sz="1800"/>
+                        <a:t>...</a:t>
+                      </a:r>
+                      <a:endParaRPr lang="en-US" sz="1800"/>
+                    </a:p>
+                  </a:txBody>
+                  <a:tcPr/>
+                </a:tc>
+                <a:tc>
+                  <a:txBody>
+                    <a:bodyPr/>
+                    <a:p>
                       <a:pPr>
                         <a:buNone/>
                       </a:pPr>
-                      <a:endParaRPr lang="en-US"/>
-                    </a:p>
-                  </a:txBody>
-                  <a:tcPr/>
-                </a:tc>
-                <a:tc>
-                  <a:txBody>
-                    <a:bodyPr/>
-                    <a:p>
-                      <a:pPr>
-                        <a:buNone/>
-                      </a:pPr>
-                      <a:endParaRPr lang="en-US"/>
-                    </a:p>
-                  </a:txBody>
-                  <a:tcPr/>
-                </a:tc>
-                <a:tc>
-                  <a:txBody>
-                    <a:bodyPr/>
-                    <a:p>
-                      <a:pPr>
-                        <a:buNone/>
-                      </a:pPr>
-                      <a:endParaRPr lang="en-US"/>
+                      <a:endParaRPr lang="en-US" sz="1800"/>
                     </a:p>
                   </a:txBody>
                   <a:tcPr/>
@@ -2897,34 +2989,42 @@
                   <a:txBody>
                     <a:bodyPr/>
                     <a:p>
+                      <a:pPr algn="ctr">
+                        <a:buNone/>
+                      </a:pPr>
+                      <a:r>
+                        <a:rPr lang="en-US" sz="1800"/>
+                        <a:t>...</a:t>
+                      </a:r>
+                      <a:endParaRPr lang="en-US" sz="1800"/>
+                    </a:p>
+                  </a:txBody>
+                  <a:tcPr/>
+                </a:tc>
+                <a:tc>
+                  <a:txBody>
+                    <a:bodyPr/>
+                    <a:p>
+                      <a:pPr algn="ctr">
+                        <a:buNone/>
+                      </a:pPr>
+                      <a:r>
+                        <a:rPr lang="en-US" sz="1800"/>
+                        <a:t>...</a:t>
+                      </a:r>
+                      <a:endParaRPr lang="en-US" sz="1800"/>
+                    </a:p>
+                  </a:txBody>
+                  <a:tcPr/>
+                </a:tc>
+                <a:tc>
+                  <a:txBody>
+                    <a:bodyPr/>
+                    <a:p>
                       <a:pPr>
                         <a:buNone/>
                       </a:pPr>
-                      <a:endParaRPr lang="en-US"/>
-                    </a:p>
-                  </a:txBody>
-                  <a:tcPr/>
-                </a:tc>
-                <a:tc>
-                  <a:txBody>
-                    <a:bodyPr/>
-                    <a:p>
-                      <a:pPr>
-                        <a:buNone/>
-                      </a:pPr>
-                      <a:endParaRPr lang="en-US"/>
-                    </a:p>
-                  </a:txBody>
-                  <a:tcPr/>
-                </a:tc>
-                <a:tc>
-                  <a:txBody>
-                    <a:bodyPr/>
-                    <a:p>
-                      <a:pPr>
-                        <a:buNone/>
-                      </a:pPr>
-                      <a:endParaRPr lang="en-US"/>
+                      <a:endParaRPr lang="en-US" sz="1800"/>
                     </a:p>
                   </a:txBody>
                   <a:tcPr/>
@@ -2935,34 +3035,42 @@
                   <a:txBody>
                     <a:bodyPr/>
                     <a:p>
+                      <a:pPr algn="ctr">
+                        <a:buNone/>
+                      </a:pPr>
+                      <a:r>
+                        <a:rPr lang="en-US" sz="1800"/>
+                        <a:t>...</a:t>
+                      </a:r>
+                      <a:endParaRPr lang="en-US" sz="1800"/>
+                    </a:p>
+                  </a:txBody>
+                  <a:tcPr/>
+                </a:tc>
+                <a:tc>
+                  <a:txBody>
+                    <a:bodyPr/>
+                    <a:p>
+                      <a:pPr algn="ctr">
+                        <a:buNone/>
+                      </a:pPr>
+                      <a:r>
+                        <a:rPr lang="en-US" sz="1800"/>
+                        <a:t>...</a:t>
+                      </a:r>
+                      <a:endParaRPr lang="en-US" sz="1800"/>
+                    </a:p>
+                  </a:txBody>
+                  <a:tcPr/>
+                </a:tc>
+                <a:tc>
+                  <a:txBody>
+                    <a:bodyPr/>
+                    <a:p>
                       <a:pPr>
                         <a:buNone/>
                       </a:pPr>
-                      <a:endParaRPr lang="en-US"/>
-                    </a:p>
-                  </a:txBody>
-                  <a:tcPr/>
-                </a:tc>
-                <a:tc>
-                  <a:txBody>
-                    <a:bodyPr/>
-                    <a:p>
-                      <a:pPr>
-                        <a:buNone/>
-                      </a:pPr>
-                      <a:endParaRPr lang="en-US"/>
-                    </a:p>
-                  </a:txBody>
-                  <a:tcPr/>
-                </a:tc>
-                <a:tc>
-                  <a:txBody>
-                    <a:bodyPr/>
-                    <a:p>
-                      <a:pPr>
-                        <a:buNone/>
-                      </a:pPr>
-                      <a:endParaRPr lang="en-US"/>
+                      <a:endParaRPr lang="en-US" sz="1800"/>
                     </a:p>
                   </a:txBody>
                   <a:tcPr/>
@@ -2973,34 +3081,42 @@
                   <a:txBody>
                     <a:bodyPr/>
                     <a:p>
+                      <a:pPr algn="ctr">
+                        <a:buNone/>
+                      </a:pPr>
+                      <a:r>
+                        <a:rPr lang="en-US" sz="1800"/>
+                        <a:t>...</a:t>
+                      </a:r>
+                      <a:endParaRPr lang="en-US" sz="1800"/>
+                    </a:p>
+                  </a:txBody>
+                  <a:tcPr/>
+                </a:tc>
+                <a:tc>
+                  <a:txBody>
+                    <a:bodyPr/>
+                    <a:p>
+                      <a:pPr algn="ctr">
+                        <a:buNone/>
+                      </a:pPr>
+                      <a:r>
+                        <a:rPr lang="en-US" sz="1800"/>
+                        <a:t>...</a:t>
+                      </a:r>
+                      <a:endParaRPr lang="en-US" sz="1800"/>
+                    </a:p>
+                  </a:txBody>
+                  <a:tcPr/>
+                </a:tc>
+                <a:tc>
+                  <a:txBody>
+                    <a:bodyPr/>
+                    <a:p>
                       <a:pPr>
                         <a:buNone/>
                       </a:pPr>
-                      <a:endParaRPr lang="en-US"/>
-                    </a:p>
-                  </a:txBody>
-                  <a:tcPr/>
-                </a:tc>
-                <a:tc>
-                  <a:txBody>
-                    <a:bodyPr/>
-                    <a:p>
-                      <a:pPr>
-                        <a:buNone/>
-                      </a:pPr>
-                      <a:endParaRPr lang="en-US"/>
-                    </a:p>
-                  </a:txBody>
-                  <a:tcPr/>
-                </a:tc>
-                <a:tc>
-                  <a:txBody>
-                    <a:bodyPr/>
-                    <a:p>
-                      <a:pPr>
-                        <a:buNone/>
-                      </a:pPr>
-                      <a:endParaRPr lang="en-US"/>
+                      <a:endParaRPr lang="en-US" sz="1800"/>
                     </a:p>
                   </a:txBody>
                   <a:tcPr/>
@@ -3011,34 +3127,74 @@
                   <a:txBody>
                     <a:bodyPr/>
                     <a:p>
-                      <a:pPr>
-                        <a:buNone/>
-                      </a:pPr>
-                      <a:endParaRPr lang="en-US"/>
-                    </a:p>
-                  </a:txBody>
-                  <a:tcPr/>
-                </a:tc>
-                <a:tc>
-                  <a:txBody>
-                    <a:bodyPr/>
-                    <a:p>
-                      <a:pPr>
-                        <a:buNone/>
-                      </a:pPr>
-                      <a:endParaRPr lang="en-US"/>
-                    </a:p>
-                  </a:txBody>
-                  <a:tcPr/>
-                </a:tc>
-                <a:tc>
-                  <a:txBody>
-                    <a:bodyPr/>
-                    <a:p>
-                      <a:pPr>
-                        <a:buNone/>
-                      </a:pPr>
-                      <a:endParaRPr lang="en-US"/>
+                      <a:pPr algn="ctr">
+                        <a:buNone/>
+                      </a:pPr>
+                      <a:r>
+                        <a:rPr lang="en-US" altLang="ru-RU" sz="1800">
+                          <a:sym typeface="+mn-ea"/>
+                        </a:rPr>
+                        <a:t>I</a:t>
+                      </a:r>
+                      <a:r>
+                        <a:rPr lang="en-US" altLang="ru-RU" sz="1800" baseline="-25000">
+                          <a:sym typeface="+mn-ea"/>
+                        </a:rPr>
+                        <a:t>2i</a:t>
+                      </a:r>
+                      <a:endParaRPr lang="en-US" altLang="ru-RU" sz="1800">
+                        <a:sym typeface="+mn-ea"/>
+                      </a:endParaRPr>
+                    </a:p>
+                  </a:txBody>
+                  <a:tcPr/>
+                </a:tc>
+                <a:tc>
+                  <a:txBody>
+                    <a:bodyPr/>
+                    <a:p>
+                      <a:pPr algn="ctr">
+                        <a:buNone/>
+                      </a:pPr>
+                      <a:r>
+                        <a:rPr lang="en-US" sz="1800">
+                          <a:sym typeface="+mn-ea"/>
+                        </a:rPr>
+                        <a:t>O</a:t>
+                      </a:r>
+                      <a:r>
+                        <a:rPr lang="en-US" sz="1800" baseline="-25000">
+                          <a:sym typeface="+mn-ea"/>
+                        </a:rPr>
+                        <a:t>2i</a:t>
+                      </a:r>
+                      <a:endParaRPr lang="en-US" sz="1800" baseline="-25000">
+                        <a:sym typeface="+mn-ea"/>
+                      </a:endParaRPr>
+                    </a:p>
+                  </a:txBody>
+                  <a:tcPr/>
+                </a:tc>
+                <a:tc>
+                  <a:txBody>
+                    <a:bodyPr/>
+                    <a:p>
+                      <a:pPr algn="ctr">
+                        <a:buNone/>
+                      </a:pPr>
+                      <a:r>
+                        <a:rPr lang="en-US" sz="1800">
+                          <a:sym typeface="+mn-ea"/>
+                        </a:rPr>
+                        <a:t>S</a:t>
+                      </a:r>
+                      <a:r>
+                        <a:rPr lang="en-US" sz="1800" baseline="-25000">
+                          <a:sym typeface="+mn-ea"/>
+                        </a:rPr>
+                        <a:t>1i</a:t>
+                      </a:r>
+                      <a:endParaRPr lang="en-US" sz="1800"/>
                     </a:p>
                   </a:txBody>
                   <a:tcPr/>
@@ -3055,8 +3211,8 @@
           <p:nvPr/>
         </p:nvGraphicFramePr>
         <p:xfrm>
-          <a:off x="5099685" y="1004570"/>
-          <a:ext cx="2698115" cy="3263900"/>
+          <a:off x="4131350" y="996340"/>
+          <a:ext cx="2698115" cy="3282950"/>
         </p:xfrm>
         <a:graphic>
           <a:graphicData uri="http://schemas.openxmlformats.org/drawingml/2006/table">
@@ -3069,21 +3225,21 @@
                 <a:gridCol w="897890"/>
                 <a:gridCol w="876300"/>
               </a:tblGrid>
-              <a:tr h="543560">
-                <a:tc>
-                  <a:txBody>
-                    <a:bodyPr/>
-                    <a:p>
-                      <a:pPr algn="ctr">
-                        <a:buNone/>
-                      </a:pPr>
-                      <a:r>
-                        <a:rPr lang="en-US" sz="1400">
+              <a:tr h="642620">
+                <a:tc>
+                  <a:txBody>
+                    <a:bodyPr/>
+                    <a:p>
+                      <a:pPr algn="ctr">
+                        <a:buNone/>
+                      </a:pPr>
+                      <a:r>
+                        <a:rPr lang="en-US" sz="1800">
                           <a:sym typeface="+mn-ea"/>
                         </a:rPr>
                         <a:t>Input</a:t>
                       </a:r>
-                      <a:endParaRPr lang="en-US" sz="1400">
+                      <a:endParaRPr lang="en-US" sz="1800">
                         <a:sym typeface="+mn-ea"/>
                       </a:endParaRPr>
                     </a:p>
@@ -3098,12 +3254,12 @@
                         <a:buNone/>
                       </a:pPr>
                       <a:r>
-                        <a:rPr lang="en-US" sz="1400">
+                        <a:rPr lang="en-US" sz="1800">
                           <a:sym typeface="+mn-ea"/>
                         </a:rPr>
                         <a:t>Output</a:t>
                       </a:r>
-                      <a:endParaRPr lang="en-US" sz="1400">
+                      <a:endParaRPr lang="en-US" sz="1800">
                         <a:sym typeface="+mn-ea"/>
                       </a:endParaRPr>
                     </a:p>
@@ -3118,12 +3274,12 @@
                         <a:buNone/>
                       </a:pPr>
                       <a:r>
-                        <a:rPr lang="en-US" sz="1600">
+                        <a:rPr lang="en-US" sz="1800">
                           <a:sym typeface="+mn-ea"/>
                         </a:rPr>
                         <a:t>State</a:t>
                       </a:r>
-                      <a:endParaRPr lang="en-US" sz="1600">
+                      <a:endParaRPr lang="en-US" sz="1800">
                         <a:sym typeface="+mn-ea"/>
                       </a:endParaRPr>
                     </a:p>
@@ -3131,13 +3287,203 @@
                       <a:pPr>
                         <a:buNone/>
                       </a:pPr>
-                      <a:endParaRPr lang="en-US"/>
+                      <a:endParaRPr lang="en-US" sz="1800">
+                        <a:sym typeface="+mn-ea"/>
+                      </a:endParaRPr>
                     </a:p>
                   </a:txBody>
                   <a:tcPr/>
                 </a:tc>
               </a:tr>
-              <a:tr h="545465">
+              <a:tr h="529590">
+                <a:tc>
+                  <a:txBody>
+                    <a:bodyPr/>
+                    <a:p>
+                      <a:pPr algn="ctr">
+                        <a:buNone/>
+                      </a:pPr>
+                      <a:r>
+                        <a:rPr lang="en-US" altLang="ru-RU" sz="1800">
+                          <a:sym typeface="+mn-ea"/>
+                        </a:rPr>
+                        <a:t>I</a:t>
+                      </a:r>
+                      <a:r>
+                        <a:rPr lang="en-US" altLang="ru-RU" sz="1800" baseline="-25000">
+                          <a:sym typeface="+mn-ea"/>
+                        </a:rPr>
+                        <a:t>21</a:t>
+                      </a:r>
+                      <a:endParaRPr lang="en-US" altLang="ru-RU" sz="1800">
+                        <a:sym typeface="+mn-ea"/>
+                      </a:endParaRPr>
+                    </a:p>
+                  </a:txBody>
+                  <a:tcPr/>
+                </a:tc>
+                <a:tc>
+                  <a:txBody>
+                    <a:bodyPr/>
+                    <a:p>
+                      <a:pPr algn="ctr">
+                        <a:buNone/>
+                      </a:pPr>
+                      <a:r>
+                        <a:rPr lang="en-US" sz="1800">
+                          <a:sym typeface="+mn-ea"/>
+                        </a:rPr>
+                        <a:t>O</a:t>
+                      </a:r>
+                      <a:r>
+                        <a:rPr lang="en-US" sz="1800" baseline="-25000">
+                          <a:sym typeface="+mn-ea"/>
+                        </a:rPr>
+                        <a:t>21</a:t>
+                      </a:r>
+                      <a:endParaRPr lang="en-US" sz="1800" baseline="-25000">
+                        <a:sym typeface="+mn-ea"/>
+                      </a:endParaRPr>
+                    </a:p>
+                  </a:txBody>
+                  <a:tcPr/>
+                </a:tc>
+                <a:tc>
+                  <a:txBody>
+                    <a:bodyPr/>
+                    <a:p>
+                      <a:pPr algn="ctr">
+                        <a:buNone/>
+                      </a:pPr>
+                      <a:r>
+                        <a:rPr lang="en-US" sz="1800">
+                          <a:sym typeface="+mn-ea"/>
+                        </a:rPr>
+                        <a:t>S</a:t>
+                      </a:r>
+                      <a:r>
+                        <a:rPr lang="en-US" sz="1800" baseline="-25000">
+                          <a:sym typeface="+mn-ea"/>
+                        </a:rPr>
+                        <a:t>21</a:t>
+                      </a:r>
+                      <a:endParaRPr lang="en-US" sz="1800"/>
+                    </a:p>
+                  </a:txBody>
+                  <a:tcPr/>
+                </a:tc>
+              </a:tr>
+              <a:tr h="527050">
+                <a:tc>
+                  <a:txBody>
+                    <a:bodyPr/>
+                    <a:p>
+                      <a:pPr algn="ctr">
+                        <a:buNone/>
+                      </a:pPr>
+                      <a:r>
+                        <a:rPr lang="en-US" altLang="ru-RU" sz="1800">
+                          <a:sym typeface="+mn-ea"/>
+                        </a:rPr>
+                        <a:t>I</a:t>
+                      </a:r>
+                      <a:r>
+                        <a:rPr lang="en-US" altLang="ru-RU" sz="1800" baseline="-25000">
+                          <a:sym typeface="+mn-ea"/>
+                        </a:rPr>
+                        <a:t>22</a:t>
+                      </a:r>
+                      <a:endParaRPr lang="en-US" altLang="ru-RU" sz="1800">
+                        <a:sym typeface="+mn-ea"/>
+                      </a:endParaRPr>
+                    </a:p>
+                  </a:txBody>
+                  <a:tcPr/>
+                </a:tc>
+                <a:tc>
+                  <a:txBody>
+                    <a:bodyPr/>
+                    <a:p>
+                      <a:pPr algn="ctr">
+                        <a:buNone/>
+                      </a:pPr>
+                      <a:r>
+                        <a:rPr lang="en-US" sz="1800">
+                          <a:sym typeface="+mn-ea"/>
+                        </a:rPr>
+                        <a:t>O</a:t>
+                      </a:r>
+                      <a:r>
+                        <a:rPr lang="en-US" sz="1800" baseline="-25000">
+                          <a:sym typeface="+mn-ea"/>
+                        </a:rPr>
+                        <a:t>22</a:t>
+                      </a:r>
+                      <a:endParaRPr lang="en-US" sz="1800" baseline="-25000">
+                        <a:sym typeface="+mn-ea"/>
+                      </a:endParaRPr>
+                    </a:p>
+                  </a:txBody>
+                  <a:tcPr/>
+                </a:tc>
+                <a:tc>
+                  <a:txBody>
+                    <a:bodyPr/>
+                    <a:p>
+                      <a:pPr algn="ctr">
+                        <a:buNone/>
+                      </a:pPr>
+                      <a:r>
+                        <a:rPr lang="en-US" sz="1800">
+                          <a:sym typeface="+mn-ea"/>
+                        </a:rPr>
+                        <a:t>S</a:t>
+                      </a:r>
+                      <a:r>
+                        <a:rPr lang="en-US" sz="1800" baseline="-25000">
+                          <a:sym typeface="+mn-ea"/>
+                        </a:rPr>
+                        <a:t>22</a:t>
+                      </a:r>
+                      <a:endParaRPr lang="en-US" sz="1800"/>
+                    </a:p>
+                  </a:txBody>
+                  <a:tcPr/>
+                </a:tc>
+              </a:tr>
+              <a:tr h="527050">
+                <a:tc>
+                  <a:txBody>
+                    <a:bodyPr/>
+                    <a:p>
+                      <a:pPr algn="ctr">
+                        <a:buNone/>
+                      </a:pPr>
+                      <a:r>
+                        <a:rPr lang="en-US" sz="1800"/>
+                        <a:t>...</a:t>
+                      </a:r>
+                      <a:endParaRPr lang="en-US" sz="1800"/>
+                    </a:p>
+                  </a:txBody>
+                  <a:tcPr/>
+                </a:tc>
+                <a:tc>
+                  <a:txBody>
+                    <a:bodyPr/>
+                    <a:p>
+                      <a:pPr algn="ctr">
+                        <a:buNone/>
+                      </a:pPr>
+                      <a:r>
+                        <a:rPr lang="en-US" sz="1800"/>
+                        <a:t>...</a:t>
+                      </a:r>
+                      <a:endParaRPr lang="en-US" sz="1800"/>
+                    </a:p>
+                  </a:txBody>
+                  <a:tcPr/>
+                </a:tc>
                 <a:tc>
                   <a:txBody>
                     <a:bodyPr/>
@@ -3145,7 +3491,41 @@
                       <a:pPr>
                         <a:buNone/>
                       </a:pPr>
-                      <a:endParaRPr lang="en-US"/>
+                      <a:endParaRPr lang="en-US" sz="1800"/>
+                    </a:p>
+                  </a:txBody>
+                  <a:tcPr/>
+                </a:tc>
+              </a:tr>
+              <a:tr h="528955">
+                <a:tc>
+                  <a:txBody>
+                    <a:bodyPr/>
+                    <a:p>
+                      <a:pPr algn="ctr">
+                        <a:buNone/>
+                      </a:pPr>
+                      <a:r>
+                        <a:rPr lang="en-US" sz="1800"/>
+                        <a:t>...</a:t>
+                      </a:r>
+                      <a:endParaRPr lang="en-US" sz="1800"/>
+                    </a:p>
+                  </a:txBody>
+                  <a:tcPr/>
+                </a:tc>
+                <a:tc>
+                  <a:txBody>
+                    <a:bodyPr/>
+                    <a:p>
+                      <a:pPr algn="ctr">
+                        <a:buNone/>
+                      </a:pPr>
+                      <a:r>
+                        <a:rPr lang="en-US" sz="1800"/>
+                        <a:t>...</a:t>
+                      </a:r>
+                      <a:endParaRPr lang="en-US" sz="1800"/>
                     </a:p>
                   </a:txBody>
                   <a:tcPr/>
@@ -3157,171 +3537,85 @@
                       <a:pPr>
                         <a:buNone/>
                       </a:pPr>
-                      <a:endParaRPr lang="en-US"/>
-                    </a:p>
-                  </a:txBody>
-                  <a:tcPr/>
-                </a:tc>
-                <a:tc>
-                  <a:txBody>
-                    <a:bodyPr/>
-                    <a:p>
-                      <a:pPr>
-                        <a:buNone/>
-                      </a:pPr>
-                      <a:endParaRPr lang="en-US"/>
+                      <a:endParaRPr lang="en-US" sz="1800"/>
                     </a:p>
                   </a:txBody>
                   <a:tcPr/>
                 </a:tc>
               </a:tr>
-              <a:tr h="542925">
-                <a:tc>
-                  <a:txBody>
-                    <a:bodyPr/>
-                    <a:p>
-                      <a:pPr>
-                        <a:buNone/>
-                      </a:pPr>
-                      <a:endParaRPr lang="en-US"/>
-                    </a:p>
-                  </a:txBody>
-                  <a:tcPr/>
-                </a:tc>
-                <a:tc>
-                  <a:txBody>
-                    <a:bodyPr/>
-                    <a:p>
-                      <a:pPr>
-                        <a:buNone/>
-                      </a:pPr>
-                      <a:endParaRPr lang="en-US"/>
-                    </a:p>
-                  </a:txBody>
-                  <a:tcPr/>
-                </a:tc>
-                <a:tc>
-                  <a:txBody>
-                    <a:bodyPr/>
-                    <a:p>
-                      <a:pPr>
-                        <a:buNone/>
-                      </a:pPr>
-                      <a:endParaRPr lang="en-US"/>
-                    </a:p>
-                  </a:txBody>
-                  <a:tcPr/>
-                </a:tc>
-              </a:tr>
-              <a:tr h="542925">
-                <a:tc>
-                  <a:txBody>
-                    <a:bodyPr/>
-                    <a:p>
-                      <a:pPr>
-                        <a:buNone/>
-                      </a:pPr>
-                      <a:endParaRPr lang="en-US"/>
-                    </a:p>
-                  </a:txBody>
-                  <a:tcPr/>
-                </a:tc>
-                <a:tc>
-                  <a:txBody>
-                    <a:bodyPr/>
-                    <a:p>
-                      <a:pPr>
-                        <a:buNone/>
-                      </a:pPr>
-                      <a:endParaRPr lang="en-US"/>
-                    </a:p>
-                  </a:txBody>
-                  <a:tcPr/>
-                </a:tc>
-                <a:tc>
-                  <a:txBody>
-                    <a:bodyPr/>
-                    <a:p>
-                      <a:pPr>
-                        <a:buNone/>
-                      </a:pPr>
-                      <a:endParaRPr lang="en-US"/>
-                    </a:p>
-                  </a:txBody>
-                  <a:tcPr/>
-                </a:tc>
-              </a:tr>
-              <a:tr h="545465">
-                <a:tc>
-                  <a:txBody>
-                    <a:bodyPr/>
-                    <a:p>
-                      <a:pPr>
-                        <a:buNone/>
-                      </a:pPr>
-                      <a:endParaRPr lang="en-US"/>
-                    </a:p>
-                  </a:txBody>
-                  <a:tcPr/>
-                </a:tc>
-                <a:tc>
-                  <a:txBody>
-                    <a:bodyPr/>
-                    <a:p>
-                      <a:pPr>
-                        <a:buNone/>
-                      </a:pPr>
-                      <a:endParaRPr lang="en-US"/>
-                    </a:p>
-                  </a:txBody>
-                  <a:tcPr/>
-                </a:tc>
-                <a:tc>
-                  <a:txBody>
-                    <a:bodyPr/>
-                    <a:p>
-                      <a:pPr>
-                        <a:buNone/>
-                      </a:pPr>
-                      <a:endParaRPr lang="en-US"/>
-                    </a:p>
-                  </a:txBody>
-                  <a:tcPr/>
-                </a:tc>
-              </a:tr>
-              <a:tr h="543560">
-                <a:tc>
-                  <a:txBody>
-                    <a:bodyPr/>
-                    <a:p>
-                      <a:pPr>
-                        <a:buNone/>
-                      </a:pPr>
-                      <a:endParaRPr lang="en-US"/>
-                    </a:p>
-                  </a:txBody>
-                  <a:tcPr/>
-                </a:tc>
-                <a:tc>
-                  <a:txBody>
-                    <a:bodyPr/>
-                    <a:p>
-                      <a:pPr>
-                        <a:buNone/>
-                      </a:pPr>
-                      <a:endParaRPr lang="en-US"/>
-                    </a:p>
-                  </a:txBody>
-                  <a:tcPr/>
-                </a:tc>
-                <a:tc>
-                  <a:txBody>
-                    <a:bodyPr/>
-                    <a:p>
-                      <a:pPr>
-                        <a:buNone/>
-                      </a:pPr>
-                      <a:endParaRPr lang="en-US"/>
+              <a:tr h="527685">
+                <a:tc>
+                  <a:txBody>
+                    <a:bodyPr/>
+                    <a:p>
+                      <a:pPr algn="ctr">
+                        <a:buNone/>
+                      </a:pPr>
+                      <a:r>
+                        <a:rPr lang="en-US" altLang="ru-RU" sz="1800">
+                          <a:sym typeface="+mn-ea"/>
+                        </a:rPr>
+                        <a:t>I</a:t>
+                      </a:r>
+                      <a:r>
+                        <a:rPr lang="en-US" altLang="ru-RU" sz="1800" baseline="-25000">
+                          <a:sym typeface="+mn-ea"/>
+                        </a:rPr>
+                        <a:t>2j</a:t>
+                      </a:r>
+                      <a:endParaRPr lang="en-US" altLang="ru-RU" sz="1800">
+                        <a:sym typeface="+mn-ea"/>
+                      </a:endParaRPr>
+                    </a:p>
+                  </a:txBody>
+                  <a:tcPr/>
+                </a:tc>
+                <a:tc>
+                  <a:txBody>
+                    <a:bodyPr/>
+                    <a:p>
+                      <a:pPr algn="ctr">
+                        <a:buNone/>
+                      </a:pPr>
+                      <a:r>
+                        <a:rPr lang="en-US" sz="1800">
+                          <a:sym typeface="+mn-ea"/>
+                        </a:rPr>
+                        <a:t>O</a:t>
+                      </a:r>
+                      <a:r>
+                        <a:rPr lang="en-US" sz="1800" baseline="-25000">
+                          <a:sym typeface="+mn-ea"/>
+                        </a:rPr>
+                        <a:t>2j</a:t>
+                      </a:r>
+                      <a:endParaRPr lang="en-US" sz="1800" baseline="-25000">
+                        <a:sym typeface="+mn-ea"/>
+                      </a:endParaRPr>
+                    </a:p>
+                  </a:txBody>
+                  <a:tcPr/>
+                </a:tc>
+                <a:tc>
+                  <a:txBody>
+                    <a:bodyPr/>
+                    <a:p>
+                      <a:pPr algn="ctr">
+                        <a:buNone/>
+                      </a:pPr>
+                      <a:r>
+                        <a:rPr lang="en-US" sz="1800">
+                          <a:sym typeface="+mn-ea"/>
+                        </a:rPr>
+                        <a:t>S</a:t>
+                      </a:r>
+                      <a:r>
+                        <a:rPr lang="en-US" sz="1800" baseline="-25000">
+                          <a:sym typeface="+mn-ea"/>
+                        </a:rPr>
+                        <a:t>2j</a:t>
+                      </a:r>
+                      <a:endParaRPr lang="en-US" sz="1800"/>
                     </a:p>
                   </a:txBody>
                   <a:tcPr/>
@@ -3338,8 +3632,8 @@
           <p:nvPr/>
         </p:nvGraphicFramePr>
         <p:xfrm>
-          <a:off x="8487410" y="1004570"/>
-          <a:ext cx="2734945" cy="1684020"/>
+          <a:off x="7519075" y="996340"/>
+          <a:ext cx="2734945" cy="2770505"/>
         </p:xfrm>
         <a:graphic>
           <a:graphicData uri="http://schemas.openxmlformats.org/drawingml/2006/table">
@@ -3352,53 +3646,53 @@
                 <a:gridCol w="909955"/>
                 <a:gridCol w="912495"/>
               </a:tblGrid>
-              <a:tr h="551180">
-                <a:tc>
-                  <a:txBody>
-                    <a:bodyPr/>
-                    <a:p>
-                      <a:pPr algn="ctr">
-                        <a:buNone/>
-                      </a:pPr>
-                      <a:r>
-                        <a:rPr lang="en-US" sz="1600"/>
+              <a:tr h="642620">
+                <a:tc>
+                  <a:txBody>
+                    <a:bodyPr/>
+                    <a:p>
+                      <a:pPr algn="ctr">
+                        <a:buNone/>
+                      </a:pPr>
+                      <a:r>
+                        <a:rPr lang="en-US" sz="1800"/>
                         <a:t>Input</a:t>
                       </a:r>
-                      <a:endParaRPr lang="en-US" sz="1600"/>
-                    </a:p>
-                  </a:txBody>
-                  <a:tcPr/>
-                </a:tc>
-                <a:tc>
-                  <a:txBody>
-                    <a:bodyPr/>
-                    <a:p>
-                      <a:pPr algn="ctr">
-                        <a:buNone/>
-                      </a:pPr>
-                      <a:r>
-                        <a:rPr lang="en-US" sz="1600"/>
+                      <a:endParaRPr lang="en-US" sz="1800"/>
+                    </a:p>
+                  </a:txBody>
+                  <a:tcPr/>
+                </a:tc>
+                <a:tc>
+                  <a:txBody>
+                    <a:bodyPr/>
+                    <a:p>
+                      <a:pPr algn="ctr">
+                        <a:buNone/>
+                      </a:pPr>
+                      <a:r>
+                        <a:rPr lang="en-US" sz="1800"/>
                         <a:t>Output</a:t>
                       </a:r>
-                      <a:endParaRPr lang="en-US" sz="1600"/>
-                    </a:p>
-                  </a:txBody>
-                  <a:tcPr/>
-                </a:tc>
-                <a:tc>
-                  <a:txBody>
-                    <a:bodyPr/>
-                    <a:p>
-                      <a:pPr algn="ctr">
-                        <a:buNone/>
-                      </a:pPr>
-                      <a:r>
-                        <a:rPr lang="en-US" sz="1600">
+                      <a:endParaRPr lang="en-US" sz="1800"/>
+                    </a:p>
+                  </a:txBody>
+                  <a:tcPr/>
+                </a:tc>
+                <a:tc>
+                  <a:txBody>
+                    <a:bodyPr/>
+                    <a:p>
+                      <a:pPr algn="ctr">
+                        <a:buNone/>
+                      </a:pPr>
+                      <a:r>
+                        <a:rPr lang="en-US" sz="1800">
                           <a:sym typeface="+mn-ea"/>
                         </a:rPr>
                         <a:t>State</a:t>
                       </a:r>
-                      <a:endParaRPr lang="en-US" sz="1600">
+                      <a:endParaRPr lang="en-US" sz="1800">
                         <a:sym typeface="+mn-ea"/>
                       </a:endParaRPr>
                     </a:p>
@@ -3406,7 +3700,7 @@
                       <a:pPr algn="ctr">
                         <a:buNone/>
                       </a:pPr>
-                      <a:endParaRPr lang="en-US" sz="1600">
+                      <a:endParaRPr lang="en-US" sz="1800">
                         <a:sym typeface="+mn-ea"/>
                       </a:endParaRPr>
                     </a:p>
@@ -3414,77 +3708,269 @@
                   <a:tcPr/>
                 </a:tc>
               </a:tr>
-              <a:tr h="551180">
-                <a:tc>
-                  <a:txBody>
-                    <a:bodyPr/>
-                    <a:p>
-                      <a:pPr>
-                        <a:buNone/>
-                      </a:pPr>
-                      <a:endParaRPr lang="en-US"/>
-                    </a:p>
-                  </a:txBody>
-                  <a:tcPr/>
-                </a:tc>
-                <a:tc>
-                  <a:txBody>
-                    <a:bodyPr/>
-                    <a:p>
-                      <a:pPr>
-                        <a:buNone/>
-                      </a:pPr>
-                      <a:endParaRPr lang="en-US"/>
-                    </a:p>
-                  </a:txBody>
-                  <a:tcPr/>
-                </a:tc>
-                <a:tc>
-                  <a:txBody>
-                    <a:bodyPr/>
-                    <a:p>
-                      <a:pPr>
-                        <a:buNone/>
-                      </a:pPr>
-                      <a:endParaRPr lang="en-US"/>
+              <a:tr h="531495">
+                <a:tc>
+                  <a:txBody>
+                    <a:bodyPr/>
+                    <a:p>
+                      <a:pPr algn="ctr">
+                        <a:buNone/>
+                      </a:pPr>
+                      <a:r>
+                        <a:rPr lang="en-US" altLang="ru-RU" sz="1800">
+                          <a:sym typeface="+mn-ea"/>
+                        </a:rPr>
+                        <a:t>I</a:t>
+                      </a:r>
+                      <a:r>
+                        <a:rPr lang="en-US" altLang="ru-RU" sz="1800" baseline="-25000">
+                          <a:sym typeface="+mn-ea"/>
+                        </a:rPr>
+                        <a:t>31</a:t>
+                      </a:r>
+                      <a:endParaRPr lang="en-US" altLang="ru-RU" sz="1800">
+                        <a:sym typeface="+mn-ea"/>
+                      </a:endParaRPr>
+                    </a:p>
+                  </a:txBody>
+                  <a:tcPr/>
+                </a:tc>
+                <a:tc>
+                  <a:txBody>
+                    <a:bodyPr/>
+                    <a:p>
+                      <a:pPr algn="ctr">
+                        <a:buNone/>
+                      </a:pPr>
+                      <a:r>
+                        <a:rPr lang="en-US" sz="1800">
+                          <a:sym typeface="+mn-ea"/>
+                        </a:rPr>
+                        <a:t>O</a:t>
+                      </a:r>
+                      <a:r>
+                        <a:rPr lang="en-US" sz="1800" baseline="-25000">
+                          <a:sym typeface="+mn-ea"/>
+                        </a:rPr>
+                        <a:t>31</a:t>
+                      </a:r>
+                      <a:endParaRPr lang="en-US" sz="1800">
+                        <a:sym typeface="+mn-ea"/>
+                      </a:endParaRPr>
+                    </a:p>
+                  </a:txBody>
+                  <a:tcPr/>
+                </a:tc>
+                <a:tc>
+                  <a:txBody>
+                    <a:bodyPr/>
+                    <a:p>
+                      <a:pPr algn="ctr">
+                        <a:buNone/>
+                      </a:pPr>
+                      <a:r>
+                        <a:rPr lang="en-US" sz="1800">
+                          <a:sym typeface="+mn-ea"/>
+                        </a:rPr>
+                        <a:t>S</a:t>
+                      </a:r>
+                      <a:r>
+                        <a:rPr lang="en-US" sz="1800" baseline="-25000">
+                          <a:sym typeface="+mn-ea"/>
+                        </a:rPr>
+                        <a:t>31</a:t>
+                      </a:r>
+                      <a:endParaRPr lang="en-US" sz="1800"/>
                     </a:p>
                   </a:txBody>
                   <a:tcPr/>
                 </a:tc>
               </a:tr>
-              <a:tr h="551180">
-                <a:tc>
-                  <a:txBody>
-                    <a:bodyPr/>
-                    <a:p>
-                      <a:pPr>
-                        <a:buNone/>
-                      </a:pPr>
-                      <a:endParaRPr lang="en-US"/>
-                    </a:p>
-                  </a:txBody>
-                  <a:tcPr/>
-                </a:tc>
-                <a:tc>
-                  <a:txBody>
-                    <a:bodyPr/>
-                    <a:p>
-                      <a:pPr>
-                        <a:buNone/>
-                      </a:pPr>
-                      <a:endParaRPr lang="en-US"/>
-                    </a:p>
-                  </a:txBody>
-                  <a:tcPr/>
-                </a:tc>
-                <a:tc>
-                  <a:txBody>
-                    <a:bodyPr/>
-                    <a:p>
-                      <a:pPr>
-                        <a:buNone/>
-                      </a:pPr>
-                      <a:endParaRPr lang="en-US"/>
+              <a:tr h="532130">
+                <a:tc>
+                  <a:txBody>
+                    <a:bodyPr/>
+                    <a:p>
+                      <a:pPr algn="ctr">
+                        <a:buNone/>
+                      </a:pPr>
+                      <a:r>
+                        <a:rPr lang="en-US" altLang="ru-RU" sz="1800">
+                          <a:sym typeface="+mn-ea"/>
+                        </a:rPr>
+                        <a:t>I</a:t>
+                      </a:r>
+                      <a:r>
+                        <a:rPr lang="en-US" altLang="ru-RU" sz="1800" baseline="-25000">
+                          <a:sym typeface="+mn-ea"/>
+                        </a:rPr>
+                        <a:t>32</a:t>
+                      </a:r>
+                      <a:endParaRPr lang="en-US" altLang="ru-RU" sz="1800">
+                        <a:sym typeface="+mn-ea"/>
+                      </a:endParaRPr>
+                    </a:p>
+                  </a:txBody>
+                  <a:tcPr/>
+                </a:tc>
+                <a:tc>
+                  <a:txBody>
+                    <a:bodyPr/>
+                    <a:p>
+                      <a:pPr algn="ctr">
+                        <a:buNone/>
+                      </a:pPr>
+                      <a:r>
+                        <a:rPr lang="en-US" sz="1800">
+                          <a:sym typeface="+mn-ea"/>
+                        </a:rPr>
+                        <a:t>O</a:t>
+                      </a:r>
+                      <a:r>
+                        <a:rPr lang="en-US" sz="1800" baseline="-25000">
+                          <a:sym typeface="+mn-ea"/>
+                        </a:rPr>
+                        <a:t>32</a:t>
+                      </a:r>
+                      <a:endParaRPr lang="en-US" sz="1800" baseline="-25000">
+                        <a:sym typeface="+mn-ea"/>
+                      </a:endParaRPr>
+                    </a:p>
+                  </a:txBody>
+                  <a:tcPr/>
+                </a:tc>
+                <a:tc>
+                  <a:txBody>
+                    <a:bodyPr/>
+                    <a:p>
+                      <a:pPr algn="ctr">
+                        <a:buNone/>
+                      </a:pPr>
+                      <a:endParaRPr lang="en-US" sz="1800"/>
+                    </a:p>
+                  </a:txBody>
+                  <a:tcPr/>
+                </a:tc>
+              </a:tr>
+              <a:tr h="532130">
+                <a:tc>
+                  <a:txBody>
+                    <a:bodyPr/>
+                    <a:p>
+                      <a:pPr algn="ctr">
+                        <a:buNone/>
+                      </a:pPr>
+                      <a:r>
+                        <a:rPr lang="en-US" sz="1800"/>
+                        <a:t>...</a:t>
+                      </a:r>
+                      <a:endParaRPr lang="en-US" sz="1800"/>
+                    </a:p>
+                  </a:txBody>
+                  <a:tcPr/>
+                </a:tc>
+                <a:tc>
+                  <a:txBody>
+                    <a:bodyPr/>
+                    <a:p>
+                      <a:pPr algn="ctr">
+                        <a:buNone/>
+                      </a:pPr>
+                      <a:r>
+                        <a:rPr lang="en-US" sz="1800"/>
+                        <a:t>...</a:t>
+                      </a:r>
+                      <a:endParaRPr lang="en-US" sz="1800"/>
+                    </a:p>
+                  </a:txBody>
+                  <a:tcPr/>
+                </a:tc>
+                <a:tc>
+                  <a:txBody>
+                    <a:bodyPr/>
+                    <a:p>
+                      <a:pPr algn="ctr">
+                        <a:buNone/>
+                      </a:pPr>
+                      <a:endParaRPr lang="en-US" sz="1800"/>
+                    </a:p>
+                  </a:txBody>
+                  <a:tcPr/>
+                </a:tc>
+              </a:tr>
+              <a:tr h="532130">
+                <a:tc>
+                  <a:txBody>
+                    <a:bodyPr/>
+                    <a:p>
+                      <a:pPr algn="ctr">
+                        <a:buNone/>
+                      </a:pPr>
+                      <a:r>
+                        <a:rPr lang="en-US" altLang="ru-RU" sz="1800">
+                          <a:sym typeface="+mn-ea"/>
+                        </a:rPr>
+                        <a:t>I</a:t>
+                      </a:r>
+                      <a:r>
+                        <a:rPr lang="en-US" altLang="ru-RU" sz="1800" baseline="-25000">
+                          <a:sym typeface="+mn-ea"/>
+                        </a:rPr>
+                        <a:t>3k</a:t>
+                      </a:r>
+                      <a:endParaRPr lang="en-US" altLang="ru-RU" sz="1800">
+                        <a:sym typeface="+mn-ea"/>
+                      </a:endParaRPr>
+                    </a:p>
+                  </a:txBody>
+                  <a:tcPr/>
+                </a:tc>
+                <a:tc>
+                  <a:txBody>
+                    <a:bodyPr/>
+                    <a:p>
+                      <a:pPr algn="ctr">
+                        <a:buNone/>
+                      </a:pPr>
+                      <a:r>
+                        <a:rPr lang="en-US" sz="1800">
+                          <a:sym typeface="+mn-ea"/>
+                        </a:rPr>
+                        <a:t>O</a:t>
+                      </a:r>
+                      <a:r>
+                        <a:rPr lang="en-US" sz="1800" baseline="-25000">
+                          <a:sym typeface="+mn-ea"/>
+                        </a:rPr>
+                        <a:t>3k</a:t>
+                      </a:r>
+                      <a:endParaRPr lang="en-US" sz="1800" baseline="-25000">
+                        <a:sym typeface="+mn-ea"/>
+                      </a:endParaRPr>
+                    </a:p>
+                  </a:txBody>
+                  <a:tcPr/>
+                </a:tc>
+                <a:tc>
+                  <a:txBody>
+                    <a:bodyPr/>
+                    <a:p>
+                      <a:pPr algn="ctr">
+                        <a:buNone/>
+                      </a:pPr>
+                      <a:r>
+                        <a:rPr lang="en-US" sz="1800">
+                          <a:sym typeface="+mn-ea"/>
+                        </a:rPr>
+                        <a:t>S</a:t>
+                      </a:r>
+                      <a:r>
+                        <a:rPr lang="en-US" sz="1800" baseline="-25000">
+                          <a:sym typeface="+mn-ea"/>
+                        </a:rPr>
+                        <a:t>3k</a:t>
+                      </a:r>
+                      <a:endParaRPr lang="en-US" sz="1800"/>
                     </a:p>
                   </a:txBody>
                   <a:tcPr/>
@@ -3502,7 +3988,7 @@
         </p:nvSpPr>
         <p:spPr>
           <a:xfrm>
-            <a:off x="1682115" y="482600"/>
+            <a:off x="713740" y="440055"/>
             <a:ext cx="2682875" cy="368300"/>
           </a:xfrm>
           <a:prstGeom prst="rect">
@@ -3523,7 +4009,15 @@
             <a:pPr algn="ctr"/>
             <a:r>
               <a:rPr lang="en-US"/>
-              <a:t>Type 1</a:t>
+              <a:t>Type 1 (N</a:t>
+            </a:r>
+            <a:r>
+              <a:rPr lang="en-US" baseline="-25000"/>
+              <a:t>jobs</a:t>
+            </a:r>
+            <a:r>
+              <a:rPr lang="en-US"/>
+              <a:t>)=i</a:t>
             </a:r>
             <a:endParaRPr lang="en-US"/>
           </a:p>
@@ -3537,7 +4031,7 @@
         </p:nvSpPr>
         <p:spPr>
           <a:xfrm>
-            <a:off x="5099685" y="482600"/>
+            <a:off x="4131310" y="440055"/>
             <a:ext cx="2682875" cy="368300"/>
           </a:xfrm>
           <a:prstGeom prst="rect">
@@ -3558,7 +4052,25 @@
             <a:pPr algn="ctr"/>
             <a:r>
               <a:rPr lang="en-US"/>
-              <a:t>Type 2</a:t>
+              <a:t>Type 2 </a:t>
+            </a:r>
+            <a:r>
+              <a:rPr lang="en-US">
+                <a:sym typeface="+mn-ea"/>
+              </a:rPr>
+              <a:t> (N</a:t>
+            </a:r>
+            <a:r>
+              <a:rPr lang="en-US" baseline="-25000">
+                <a:sym typeface="+mn-ea"/>
+              </a:rPr>
+              <a:t>jobs</a:t>
+            </a:r>
+            <a:r>
+              <a:rPr lang="en-US">
+                <a:sym typeface="+mn-ea"/>
+              </a:rPr>
+              <a:t>)=j</a:t>
             </a:r>
             <a:endParaRPr lang="en-US"/>
           </a:p>
@@ -3572,7 +4084,7 @@
         </p:nvSpPr>
         <p:spPr>
           <a:xfrm>
-            <a:off x="8487410" y="482600"/>
+            <a:off x="7519035" y="440055"/>
             <a:ext cx="2682875" cy="368300"/>
           </a:xfrm>
           <a:prstGeom prst="rect">
@@ -3593,7 +4105,25 @@
             <a:pPr algn="ctr"/>
             <a:r>
               <a:rPr lang="en-US"/>
-              <a:t>Type 3</a:t>
+              <a:t>Type 3 </a:t>
+            </a:r>
+            <a:r>
+              <a:rPr lang="en-US">
+                <a:sym typeface="+mn-ea"/>
+              </a:rPr>
+              <a:t> (N</a:t>
+            </a:r>
+            <a:r>
+              <a:rPr lang="en-US" baseline="-25000">
+                <a:sym typeface="+mn-ea"/>
+              </a:rPr>
+              <a:t>jobs</a:t>
+            </a:r>
+            <a:r>
+              <a:rPr lang="en-US">
+                <a:sym typeface="+mn-ea"/>
+              </a:rPr>
+              <a:t>)=k</a:t>
             </a:r>
             <a:endParaRPr lang="en-US"/>
           </a:p>
@@ -3606,9 +4136,141 @@
           <p:nvPr/>
         </p:nvCxnSpPr>
         <p:spPr>
+          <a:xfrm>
+            <a:off x="2237145" y="1807870"/>
+            <a:ext cx="2099945" cy="0"/>
+          </a:xfrm>
+          <a:prstGeom prst="straightConnector1">
+            <a:avLst/>
+          </a:prstGeom>
+          <a:ln w="19050">
+            <a:tailEnd type="arrow"/>
+          </a:ln>
+        </p:spPr>
+        <p:style>
+          <a:lnRef idx="1">
+            <a:schemeClr val="accent1"/>
+          </a:lnRef>
+          <a:fillRef idx="0">
+            <a:schemeClr val="accent1"/>
+          </a:fillRef>
+          <a:effectRef idx="0">
+            <a:schemeClr val="accent1"/>
+          </a:effectRef>
+          <a:fontRef idx="minor">
+            <a:schemeClr val="tx1"/>
+          </a:fontRef>
+        </p:style>
+      </p:cxnSp>
+      <p:cxnSp>
+        <p:nvCxnSpPr>
+          <p:cNvPr id="13" name="Straight Arrow Connector 12"/>
+          <p:cNvCxnSpPr/>
+          <p:nvPr/>
+        </p:nvCxnSpPr>
+        <p:spPr>
           <a:xfrm flipV="1">
-            <a:off x="4378325" y="1806575"/>
-            <a:ext cx="690880" cy="56515"/>
+            <a:off x="5730915" y="1826920"/>
+            <a:ext cx="2020570" cy="8890"/>
+          </a:xfrm>
+          <a:prstGeom prst="straightConnector1">
+            <a:avLst/>
+          </a:prstGeom>
+          <a:ln w="19050">
+            <a:tailEnd type="arrow"/>
+          </a:ln>
+        </p:spPr>
+        <p:style>
+          <a:lnRef idx="1">
+            <a:schemeClr val="accent1"/>
+          </a:lnRef>
+          <a:fillRef idx="0">
+            <a:schemeClr val="accent1"/>
+          </a:fillRef>
+          <a:effectRef idx="0">
+            <a:schemeClr val="accent1"/>
+          </a:effectRef>
+          <a:fontRef idx="minor">
+            <a:schemeClr val="tx1"/>
+          </a:fontRef>
+        </p:style>
+      </p:cxnSp>
+      <p:cxnSp>
+        <p:nvCxnSpPr>
+          <p:cNvPr id="25" name="Straight Arrow Connector 24"/>
+          <p:cNvCxnSpPr/>
+          <p:nvPr/>
+        </p:nvCxnSpPr>
+        <p:spPr>
+          <a:xfrm>
+            <a:off x="2237145" y="2388895"/>
+            <a:ext cx="2099945" cy="0"/>
+          </a:xfrm>
+          <a:prstGeom prst="straightConnector1">
+            <a:avLst/>
+          </a:prstGeom>
+          <a:ln w="19050">
+            <a:tailEnd type="arrow"/>
+          </a:ln>
+        </p:spPr>
+        <p:style>
+          <a:lnRef idx="1">
+            <a:schemeClr val="accent1"/>
+          </a:lnRef>
+          <a:fillRef idx="0">
+            <a:schemeClr val="accent1"/>
+          </a:fillRef>
+          <a:effectRef idx="0">
+            <a:schemeClr val="accent1"/>
+          </a:effectRef>
+          <a:fontRef idx="minor">
+            <a:schemeClr val="tx1"/>
+          </a:fontRef>
+        </p:style>
+      </p:cxnSp>
+      <p:cxnSp>
+        <p:nvCxnSpPr>
+          <p:cNvPr id="26" name="Straight Arrow Connector 25"/>
+          <p:cNvCxnSpPr/>
+          <p:nvPr/>
+        </p:nvCxnSpPr>
+        <p:spPr>
+          <a:xfrm>
+            <a:off x="2237145" y="2956585"/>
+            <a:ext cx="2099945" cy="0"/>
+          </a:xfrm>
+          <a:prstGeom prst="straightConnector1">
+            <a:avLst/>
+          </a:prstGeom>
+          <a:ln w="19050">
+            <a:tailEnd type="arrow"/>
+          </a:ln>
+        </p:spPr>
+        <p:style>
+          <a:lnRef idx="1">
+            <a:schemeClr val="accent1"/>
+          </a:lnRef>
+          <a:fillRef idx="0">
+            <a:schemeClr val="accent1"/>
+          </a:fillRef>
+          <a:effectRef idx="0">
+            <a:schemeClr val="accent1"/>
+          </a:effectRef>
+          <a:fontRef idx="minor">
+            <a:schemeClr val="tx1"/>
+          </a:fontRef>
+        </p:style>
+      </p:cxnSp>
+      <p:cxnSp>
+        <p:nvCxnSpPr>
+          <p:cNvPr id="27" name="Straight Arrow Connector 26"/>
+          <p:cNvCxnSpPr/>
+          <p:nvPr/>
+        </p:nvCxnSpPr>
+        <p:spPr>
+          <a:xfrm>
+            <a:off x="5690910" y="2388895"/>
+            <a:ext cx="2099945" cy="0"/>
           </a:xfrm>
           <a:prstGeom prst="straightConnector1">
             <a:avLst/>

</xml_diff>

<commit_message>
First draft is ready
</commit_message>
<xml_diff>
--- a/figures/prompt_queues_1.pptx
+++ b/figures/prompt_queues_1.pptx
@@ -7,7 +7,7 @@
   <p:sldIdLst>
     <p:sldId id="256" r:id="rId3"/>
   </p:sldIdLst>
-  <p:sldSz cx="10972800" cy="6858000"/>
+  <p:sldSz cx="10972800" cy="6490335"/>
   <p:notesSz cx="7103745" cy="10234295"/>
   <p:defaultTextStyle>
     <a:defPPr>
@@ -136,15 +136,15 @@
         </p:nvSpPr>
         <p:spPr>
           <a:xfrm>
-            <a:off x="1371610" y="1122371"/>
-            <a:ext cx="8229660" cy="2387617"/>
+            <a:off x="1371620" y="1062283"/>
+            <a:ext cx="8229720" cy="2259793"/>
           </a:xfrm>
         </p:spPr>
         <p:txBody>
           <a:bodyPr anchor="b"/>
           <a:lstStyle>
             <a:lvl1pPr algn="ctr">
-              <a:defRPr sz="6000"/>
+              <a:defRPr sz="5680"/>
             </a:lvl1pPr>
           </a:lstStyle>
           <a:p>
@@ -168,8 +168,8 @@
         </p:nvSpPr>
         <p:spPr>
           <a:xfrm>
-            <a:off x="1371610" y="3602064"/>
-            <a:ext cx="8229660" cy="1655774"/>
+            <a:off x="1371620" y="3409223"/>
+            <a:ext cx="8229720" cy="1567130"/>
           </a:xfrm>
         </p:spPr>
         <p:txBody>
@@ -177,39 +177,39 @@
           <a:lstStyle>
             <a:lvl1pPr marL="0" indent="0" algn="ctr">
               <a:buNone/>
-              <a:defRPr sz="2400"/>
+              <a:defRPr sz="2270"/>
             </a:lvl1pPr>
-            <a:lvl2pPr marL="457200" indent="0" algn="ctr">
-              <a:buNone/>
-              <a:defRPr sz="2000"/>
+            <a:lvl2pPr marL="432435" indent="0" algn="ctr">
+              <a:buNone/>
+              <a:defRPr sz="1895"/>
             </a:lvl2pPr>
-            <a:lvl3pPr marL="914400" indent="0" algn="ctr">
-              <a:buNone/>
-              <a:defRPr sz="1800"/>
+            <a:lvl3pPr marL="865505" indent="0" algn="ctr">
+              <a:buNone/>
+              <a:defRPr sz="1705"/>
             </a:lvl3pPr>
-            <a:lvl4pPr marL="1371600" indent="0" algn="ctr">
-              <a:buNone/>
-              <a:defRPr sz="1600"/>
+            <a:lvl4pPr marL="1297940" indent="0" algn="ctr">
+              <a:buNone/>
+              <a:defRPr sz="1515"/>
             </a:lvl4pPr>
-            <a:lvl5pPr marL="1828800" indent="0" algn="ctr">
-              <a:buNone/>
-              <a:defRPr sz="1600"/>
+            <a:lvl5pPr marL="1731010" indent="0" algn="ctr">
+              <a:buNone/>
+              <a:defRPr sz="1515"/>
             </a:lvl5pPr>
-            <a:lvl6pPr marL="2286000" indent="0" algn="ctr">
-              <a:buNone/>
-              <a:defRPr sz="1600"/>
+            <a:lvl6pPr marL="2163445" indent="0" algn="ctr">
+              <a:buNone/>
+              <a:defRPr sz="1515"/>
             </a:lvl6pPr>
-            <a:lvl7pPr marL="2743200" indent="0" algn="ctr">
-              <a:buNone/>
-              <a:defRPr sz="1600"/>
+            <a:lvl7pPr marL="2596515" indent="0" algn="ctr">
+              <a:buNone/>
+              <a:defRPr sz="1515"/>
             </a:lvl7pPr>
-            <a:lvl8pPr marL="3200400" indent="0" algn="ctr">
-              <a:buNone/>
-              <a:defRPr sz="1600"/>
+            <a:lvl8pPr marL="3028950" indent="0" algn="ctr">
+              <a:buNone/>
+              <a:defRPr sz="1515"/>
             </a:lvl8pPr>
-            <a:lvl9pPr marL="3657600" indent="0" algn="ctr">
-              <a:buNone/>
-              <a:defRPr sz="1600"/>
+            <a:lvl9pPr marL="3462020" indent="0" algn="ctr">
+              <a:buNone/>
+              <a:defRPr sz="1515"/>
             </a:lvl9pPr>
           </a:lstStyle>
           <a:p>
@@ -321,8 +321,8 @@
         </p:nvSpPr>
         <p:spPr>
           <a:xfrm>
-            <a:off x="754386" y="365128"/>
-            <a:ext cx="9464110" cy="5811881"/>
+            <a:off x="754392" y="345580"/>
+            <a:ext cx="9464180" cy="5500734"/>
           </a:xfrm>
         </p:spPr>
         <p:txBody>
@@ -637,15 +637,15 @@
         </p:nvSpPr>
         <p:spPr>
           <a:xfrm>
-            <a:off x="748671" y="1709751"/>
-            <a:ext cx="9464110" cy="2852758"/>
+            <a:off x="748677" y="1618217"/>
+            <a:ext cx="9464180" cy="2700032"/>
           </a:xfrm>
         </p:spPr>
         <p:txBody>
           <a:bodyPr anchor="b"/>
           <a:lstStyle>
             <a:lvl1pPr>
-              <a:defRPr sz="6000"/>
+              <a:defRPr sz="5680"/>
             </a:lvl1pPr>
           </a:lstStyle>
           <a:p>
@@ -669,8 +669,8 @@
         </p:nvSpPr>
         <p:spPr>
           <a:xfrm>
-            <a:off x="748671" y="4589497"/>
-            <a:ext cx="9464110" cy="1500198"/>
+            <a:off x="748677" y="4343792"/>
+            <a:ext cx="9464180" cy="1419883"/>
           </a:xfrm>
         </p:spPr>
         <p:txBody>
@@ -678,7 +678,7 @@
           <a:lstStyle>
             <a:lvl1pPr marL="0" indent="0">
               <a:buNone/>
-              <a:defRPr sz="2400">
+              <a:defRPr sz="2270">
                 <a:solidFill>
                   <a:schemeClr val="tx1">
                     <a:tint val="75000"/>
@@ -686,9 +686,9 @@
                 </a:solidFill>
               </a:defRPr>
             </a:lvl1pPr>
-            <a:lvl2pPr marL="457200" indent="0">
-              <a:buNone/>
-              <a:defRPr sz="2000">
+            <a:lvl2pPr marL="432435" indent="0">
+              <a:buNone/>
+              <a:defRPr sz="1895">
                 <a:solidFill>
                   <a:schemeClr val="tx1">
                     <a:tint val="75000"/>
@@ -696,9 +696,9 @@
                 </a:solidFill>
               </a:defRPr>
             </a:lvl2pPr>
-            <a:lvl3pPr marL="914400" indent="0">
-              <a:buNone/>
-              <a:defRPr sz="1800">
+            <a:lvl3pPr marL="865505" indent="0">
+              <a:buNone/>
+              <a:defRPr sz="1705">
                 <a:solidFill>
                   <a:schemeClr val="tx1">
                     <a:tint val="75000"/>
@@ -706,9 +706,9 @@
                 </a:solidFill>
               </a:defRPr>
             </a:lvl3pPr>
-            <a:lvl4pPr marL="1371600" indent="0">
-              <a:buNone/>
-              <a:defRPr sz="1600">
+            <a:lvl4pPr marL="1297940" indent="0">
+              <a:buNone/>
+              <a:defRPr sz="1515">
                 <a:solidFill>
                   <a:schemeClr val="tx1">
                     <a:tint val="75000"/>
@@ -716,9 +716,9 @@
                 </a:solidFill>
               </a:defRPr>
             </a:lvl4pPr>
-            <a:lvl5pPr marL="1828800" indent="0">
-              <a:buNone/>
-              <a:defRPr sz="1600">
+            <a:lvl5pPr marL="1731010" indent="0">
+              <a:buNone/>
+              <a:defRPr sz="1515">
                 <a:solidFill>
                   <a:schemeClr val="tx1">
                     <a:tint val="75000"/>
@@ -726,9 +726,9 @@
                 </a:solidFill>
               </a:defRPr>
             </a:lvl5pPr>
-            <a:lvl6pPr marL="2286000" indent="0">
-              <a:buNone/>
-              <a:defRPr sz="1600">
+            <a:lvl6pPr marL="2163445" indent="0">
+              <a:buNone/>
+              <a:defRPr sz="1515">
                 <a:solidFill>
                   <a:schemeClr val="tx1">
                     <a:tint val="75000"/>
@@ -736,9 +736,9 @@
                 </a:solidFill>
               </a:defRPr>
             </a:lvl6pPr>
-            <a:lvl7pPr marL="2743200" indent="0">
-              <a:buNone/>
-              <a:defRPr sz="1600">
+            <a:lvl7pPr marL="2596515" indent="0">
+              <a:buNone/>
+              <a:defRPr sz="1515">
                 <a:solidFill>
                   <a:schemeClr val="tx1">
                     <a:tint val="75000"/>
@@ -746,9 +746,9 @@
                 </a:solidFill>
               </a:defRPr>
             </a:lvl7pPr>
-            <a:lvl8pPr marL="3200400" indent="0">
-              <a:buNone/>
-              <a:defRPr sz="1600">
+            <a:lvl8pPr marL="3028950" indent="0">
+              <a:buNone/>
+              <a:defRPr sz="1515">
                 <a:solidFill>
                   <a:schemeClr val="tx1">
                     <a:tint val="75000"/>
@@ -756,9 +756,9 @@
                 </a:solidFill>
               </a:defRPr>
             </a:lvl8pPr>
-            <a:lvl9pPr marL="3657600" indent="0">
-              <a:buNone/>
-              <a:defRPr sz="1600">
+            <a:lvl9pPr marL="3462020" indent="0">
+              <a:buNone/>
+              <a:defRPr sz="1515">
                 <a:solidFill>
                   <a:schemeClr val="tx1">
                     <a:tint val="75000"/>
@@ -900,8 +900,8 @@
         </p:nvSpPr>
         <p:spPr>
           <a:xfrm>
-            <a:off x="754386" y="1825638"/>
-            <a:ext cx="4663474" cy="4351370"/>
+            <a:off x="754392" y="1727900"/>
+            <a:ext cx="4663508" cy="4118414"/>
           </a:xfrm>
         </p:spPr>
         <p:txBody>
@@ -961,8 +961,8 @@
         </p:nvSpPr>
         <p:spPr>
           <a:xfrm>
-            <a:off x="5555021" y="1825638"/>
-            <a:ext cx="4663474" cy="4351370"/>
+            <a:off x="5555062" y="1727900"/>
+            <a:ext cx="4663508" cy="4118414"/>
           </a:xfrm>
         </p:spPr>
         <p:txBody>
@@ -1110,8 +1110,8 @@
         </p:nvSpPr>
         <p:spPr>
           <a:xfrm>
-            <a:off x="755815" y="365128"/>
-            <a:ext cx="9464110" cy="1325573"/>
+            <a:off x="755821" y="345580"/>
+            <a:ext cx="9464180" cy="1254607"/>
           </a:xfrm>
         </p:spPr>
         <p:txBody>
@@ -1138,8 +1138,8 @@
         </p:nvSpPr>
         <p:spPr>
           <a:xfrm>
-            <a:off x="755815" y="1681175"/>
-            <a:ext cx="4642042" cy="823918"/>
+            <a:off x="755821" y="1591171"/>
+            <a:ext cx="4642076" cy="779808"/>
           </a:xfrm>
         </p:spPr>
         <p:txBody>
@@ -1147,39 +1147,39 @@
           <a:lstStyle>
             <a:lvl1pPr marL="0" indent="0">
               <a:buNone/>
-              <a:defRPr sz="2400" b="1"/>
+              <a:defRPr sz="2270" b="1"/>
             </a:lvl1pPr>
-            <a:lvl2pPr marL="457200" indent="0">
-              <a:buNone/>
-              <a:defRPr sz="2000" b="1"/>
+            <a:lvl2pPr marL="432435" indent="0">
+              <a:buNone/>
+              <a:defRPr sz="1895" b="1"/>
             </a:lvl2pPr>
-            <a:lvl3pPr marL="914400" indent="0">
-              <a:buNone/>
-              <a:defRPr sz="1800" b="1"/>
+            <a:lvl3pPr marL="865505" indent="0">
+              <a:buNone/>
+              <a:defRPr sz="1705" b="1"/>
             </a:lvl3pPr>
-            <a:lvl4pPr marL="1371600" indent="0">
-              <a:buNone/>
-              <a:defRPr sz="1600" b="1"/>
+            <a:lvl4pPr marL="1297940" indent="0">
+              <a:buNone/>
+              <a:defRPr sz="1515" b="1"/>
             </a:lvl4pPr>
-            <a:lvl5pPr marL="1828800" indent="0">
-              <a:buNone/>
-              <a:defRPr sz="1600" b="1"/>
+            <a:lvl5pPr marL="1731010" indent="0">
+              <a:buNone/>
+              <a:defRPr sz="1515" b="1"/>
             </a:lvl5pPr>
-            <a:lvl6pPr marL="2286000" indent="0">
-              <a:buNone/>
-              <a:defRPr sz="1600" b="1"/>
+            <a:lvl6pPr marL="2163445" indent="0">
+              <a:buNone/>
+              <a:defRPr sz="1515" b="1"/>
             </a:lvl6pPr>
-            <a:lvl7pPr marL="2743200" indent="0">
-              <a:buNone/>
-              <a:defRPr sz="1600" b="1"/>
+            <a:lvl7pPr marL="2596515" indent="0">
+              <a:buNone/>
+              <a:defRPr sz="1515" b="1"/>
             </a:lvl7pPr>
-            <a:lvl8pPr marL="3200400" indent="0">
-              <a:buNone/>
-              <a:defRPr sz="1600" b="1"/>
+            <a:lvl8pPr marL="3028950" indent="0">
+              <a:buNone/>
+              <a:defRPr sz="1515" b="1"/>
             </a:lvl8pPr>
-            <a:lvl9pPr marL="3657600" indent="0">
-              <a:buNone/>
-              <a:defRPr sz="1600" b="1"/>
+            <a:lvl9pPr marL="3462020" indent="0">
+              <a:buNone/>
+              <a:defRPr sz="1515" b="1"/>
             </a:lvl9pPr>
           </a:lstStyle>
           <a:p>
@@ -1204,8 +1204,8 @@
         </p:nvSpPr>
         <p:spPr>
           <a:xfrm>
-            <a:off x="755815" y="2505093"/>
-            <a:ext cx="4642042" cy="3684615"/>
+            <a:off x="755821" y="2370980"/>
+            <a:ext cx="4642076" cy="3487354"/>
           </a:xfrm>
         </p:spPr>
         <p:txBody>
@@ -1265,8 +1265,8 @@
         </p:nvSpPr>
         <p:spPr>
           <a:xfrm>
-            <a:off x="5555021" y="1681175"/>
-            <a:ext cx="4664903" cy="823918"/>
+            <a:off x="5555062" y="1591171"/>
+            <a:ext cx="4664937" cy="779808"/>
           </a:xfrm>
         </p:spPr>
         <p:txBody>
@@ -1274,39 +1274,39 @@
           <a:lstStyle>
             <a:lvl1pPr marL="0" indent="0">
               <a:buNone/>
-              <a:defRPr sz="2400" b="1"/>
+              <a:defRPr sz="2270" b="1"/>
             </a:lvl1pPr>
-            <a:lvl2pPr marL="457200" indent="0">
-              <a:buNone/>
-              <a:defRPr sz="2000" b="1"/>
+            <a:lvl2pPr marL="432435" indent="0">
+              <a:buNone/>
+              <a:defRPr sz="1895" b="1"/>
             </a:lvl2pPr>
-            <a:lvl3pPr marL="914400" indent="0">
-              <a:buNone/>
-              <a:defRPr sz="1800" b="1"/>
+            <a:lvl3pPr marL="865505" indent="0">
+              <a:buNone/>
+              <a:defRPr sz="1705" b="1"/>
             </a:lvl3pPr>
-            <a:lvl4pPr marL="1371600" indent="0">
-              <a:buNone/>
-              <a:defRPr sz="1600" b="1"/>
+            <a:lvl4pPr marL="1297940" indent="0">
+              <a:buNone/>
+              <a:defRPr sz="1515" b="1"/>
             </a:lvl4pPr>
-            <a:lvl5pPr marL="1828800" indent="0">
-              <a:buNone/>
-              <a:defRPr sz="1600" b="1"/>
+            <a:lvl5pPr marL="1731010" indent="0">
+              <a:buNone/>
+              <a:defRPr sz="1515" b="1"/>
             </a:lvl5pPr>
-            <a:lvl6pPr marL="2286000" indent="0">
-              <a:buNone/>
-              <a:defRPr sz="1600" b="1"/>
+            <a:lvl6pPr marL="2163445" indent="0">
+              <a:buNone/>
+              <a:defRPr sz="1515" b="1"/>
             </a:lvl6pPr>
-            <a:lvl7pPr marL="2743200" indent="0">
-              <a:buNone/>
-              <a:defRPr sz="1600" b="1"/>
+            <a:lvl7pPr marL="2596515" indent="0">
+              <a:buNone/>
+              <a:defRPr sz="1515" b="1"/>
             </a:lvl7pPr>
-            <a:lvl8pPr marL="3200400" indent="0">
-              <a:buNone/>
-              <a:defRPr sz="1600" b="1"/>
+            <a:lvl8pPr marL="3028950" indent="0">
+              <a:buNone/>
+              <a:defRPr sz="1515" b="1"/>
             </a:lvl8pPr>
-            <a:lvl9pPr marL="3657600" indent="0">
-              <a:buNone/>
-              <a:defRPr sz="1600" b="1"/>
+            <a:lvl9pPr marL="3462020" indent="0">
+              <a:buNone/>
+              <a:defRPr sz="1515" b="1"/>
             </a:lvl9pPr>
           </a:lstStyle>
           <a:p>
@@ -1331,8 +1331,8 @@
         </p:nvSpPr>
         <p:spPr>
           <a:xfrm>
-            <a:off x="5555021" y="2505093"/>
-            <a:ext cx="4664903" cy="3684615"/>
+            <a:off x="5555062" y="2370980"/>
+            <a:ext cx="4664937" cy="3487354"/>
           </a:xfrm>
         </p:spPr>
         <p:txBody>
@@ -1679,15 +1679,15 @@
         </p:nvSpPr>
         <p:spPr>
           <a:xfrm>
-            <a:off x="755815" y="457203"/>
-            <a:ext cx="3539039" cy="1600212"/>
+            <a:off x="755821" y="432726"/>
+            <a:ext cx="3539065" cy="1514543"/>
           </a:xfrm>
         </p:spPr>
         <p:txBody>
           <a:bodyPr anchor="b"/>
           <a:lstStyle>
             <a:lvl1pPr>
-              <a:defRPr sz="3200"/>
+              <a:defRPr sz="3030"/>
             </a:lvl1pPr>
           </a:lstStyle>
           <a:p>
@@ -1711,8 +1711,8 @@
         </p:nvSpPr>
         <p:spPr>
           <a:xfrm>
-            <a:off x="4664903" y="987432"/>
-            <a:ext cx="5555021" cy="4873661"/>
+            <a:off x="4664937" y="934569"/>
+            <a:ext cx="5555062" cy="4612743"/>
           </a:xfrm>
         </p:spPr>
         <p:txBody>
@@ -1720,39 +1720,39 @@
           <a:lstStyle>
             <a:lvl1pPr marL="0" indent="0">
               <a:buNone/>
-              <a:defRPr sz="3200"/>
+              <a:defRPr sz="3030"/>
             </a:lvl1pPr>
-            <a:lvl2pPr marL="457200" indent="0">
-              <a:buNone/>
-              <a:defRPr sz="2800"/>
+            <a:lvl2pPr marL="432435" indent="0">
+              <a:buNone/>
+              <a:defRPr sz="2650"/>
             </a:lvl2pPr>
-            <a:lvl3pPr marL="914400" indent="0">
-              <a:buNone/>
-              <a:defRPr sz="2400"/>
+            <a:lvl3pPr marL="865505" indent="0">
+              <a:buNone/>
+              <a:defRPr sz="2270"/>
             </a:lvl3pPr>
-            <a:lvl4pPr marL="1371600" indent="0">
-              <a:buNone/>
-              <a:defRPr sz="2000"/>
+            <a:lvl4pPr marL="1297940" indent="0">
+              <a:buNone/>
+              <a:defRPr sz="1895"/>
             </a:lvl4pPr>
-            <a:lvl5pPr marL="1828800" indent="0">
-              <a:buNone/>
-              <a:defRPr sz="2000"/>
+            <a:lvl5pPr marL="1731010" indent="0">
+              <a:buNone/>
+              <a:defRPr sz="1895"/>
             </a:lvl5pPr>
-            <a:lvl6pPr marL="2286000" indent="0">
-              <a:buNone/>
-              <a:defRPr sz="2000"/>
+            <a:lvl6pPr marL="2163445" indent="0">
+              <a:buNone/>
+              <a:defRPr sz="1895"/>
             </a:lvl6pPr>
-            <a:lvl7pPr marL="2743200" indent="0">
-              <a:buNone/>
-              <a:defRPr sz="2000"/>
+            <a:lvl7pPr marL="2596515" indent="0">
+              <a:buNone/>
+              <a:defRPr sz="1895"/>
             </a:lvl7pPr>
-            <a:lvl8pPr marL="3200400" indent="0">
-              <a:buNone/>
-              <a:defRPr sz="2000"/>
+            <a:lvl8pPr marL="3028950" indent="0">
+              <a:buNone/>
+              <a:defRPr sz="1895"/>
             </a:lvl8pPr>
-            <a:lvl9pPr marL="3657600" indent="0">
-              <a:buNone/>
-              <a:defRPr sz="2000"/>
+            <a:lvl9pPr marL="3462020" indent="0">
+              <a:buNone/>
+              <a:defRPr sz="1895"/>
             </a:lvl9pPr>
           </a:lstStyle>
           <a:p>
@@ -1772,8 +1772,8 @@
         </p:nvSpPr>
         <p:spPr>
           <a:xfrm>
-            <a:off x="755815" y="2057415"/>
-            <a:ext cx="3539039" cy="3811616"/>
+            <a:off x="755821" y="1947269"/>
+            <a:ext cx="3539065" cy="3607556"/>
           </a:xfrm>
         </p:spPr>
         <p:txBody>
@@ -1781,39 +1781,39 @@
           <a:lstStyle>
             <a:lvl1pPr marL="0" indent="0">
               <a:buNone/>
-              <a:defRPr sz="1600"/>
+              <a:defRPr sz="1515"/>
             </a:lvl1pPr>
-            <a:lvl2pPr marL="457200" indent="0">
-              <a:buNone/>
-              <a:defRPr sz="1400"/>
+            <a:lvl2pPr marL="432435" indent="0">
+              <a:buNone/>
+              <a:defRPr sz="1325"/>
             </a:lvl2pPr>
-            <a:lvl3pPr marL="914400" indent="0">
-              <a:buNone/>
-              <a:defRPr sz="1200"/>
+            <a:lvl3pPr marL="865505" indent="0">
+              <a:buNone/>
+              <a:defRPr sz="1135"/>
             </a:lvl3pPr>
-            <a:lvl4pPr marL="1371600" indent="0">
-              <a:buNone/>
-              <a:defRPr sz="1000"/>
+            <a:lvl4pPr marL="1297940" indent="0">
+              <a:buNone/>
+              <a:defRPr sz="945"/>
             </a:lvl4pPr>
-            <a:lvl5pPr marL="1828800" indent="0">
-              <a:buNone/>
-              <a:defRPr sz="1000"/>
+            <a:lvl5pPr marL="1731010" indent="0">
+              <a:buNone/>
+              <a:defRPr sz="945"/>
             </a:lvl5pPr>
-            <a:lvl6pPr marL="2286000" indent="0">
-              <a:buNone/>
-              <a:defRPr sz="1000"/>
+            <a:lvl6pPr marL="2163445" indent="0">
+              <a:buNone/>
+              <a:defRPr sz="945"/>
             </a:lvl6pPr>
-            <a:lvl7pPr marL="2743200" indent="0">
-              <a:buNone/>
-              <a:defRPr sz="1000"/>
+            <a:lvl7pPr marL="2596515" indent="0">
+              <a:buNone/>
+              <a:defRPr sz="945"/>
             </a:lvl7pPr>
-            <a:lvl8pPr marL="3200400" indent="0">
-              <a:buNone/>
-              <a:defRPr sz="1000"/>
+            <a:lvl8pPr marL="3028950" indent="0">
+              <a:buNone/>
+              <a:defRPr sz="945"/>
             </a:lvl8pPr>
-            <a:lvl9pPr marL="3657600" indent="0">
-              <a:buNone/>
-              <a:defRPr sz="1000"/>
+            <a:lvl9pPr marL="3462020" indent="0">
+              <a:buNone/>
+              <a:defRPr sz="945"/>
             </a:lvl9pPr>
           </a:lstStyle>
           <a:p>
@@ -1933,8 +1933,8 @@
         </p:nvSpPr>
         <p:spPr>
           <a:xfrm>
-            <a:off x="7852468" y="365128"/>
-            <a:ext cx="2366027" cy="5811881"/>
+            <a:off x="7852526" y="345580"/>
+            <a:ext cx="2366044" cy="5500734"/>
           </a:xfrm>
         </p:spPr>
         <p:txBody>
@@ -1961,8 +1961,8 @@
         </p:nvSpPr>
         <p:spPr>
           <a:xfrm>
-            <a:off x="754386" y="365128"/>
-            <a:ext cx="6960921" cy="5811881"/>
+            <a:off x="754392" y="345580"/>
+            <a:ext cx="6960972" cy="5500734"/>
           </a:xfrm>
         </p:spPr>
         <p:txBody>
@@ -2115,8 +2115,8 @@
         </p:nvSpPr>
         <p:spPr>
           <a:xfrm>
-            <a:off x="754386" y="365128"/>
-            <a:ext cx="9464110" cy="1325573"/>
+            <a:off x="754392" y="345580"/>
+            <a:ext cx="9464180" cy="1254607"/>
           </a:xfrm>
           <a:prstGeom prst="rect">
             <a:avLst/>
@@ -2148,8 +2148,8 @@
         </p:nvSpPr>
         <p:spPr>
           <a:xfrm>
-            <a:off x="754386" y="1825638"/>
-            <a:ext cx="9464110" cy="4351370"/>
+            <a:off x="754392" y="1727900"/>
+            <a:ext cx="9464180" cy="4118414"/>
           </a:xfrm>
           <a:prstGeom prst="rect">
             <a:avLst/>
@@ -2214,8 +2214,8 @@
         </p:nvSpPr>
         <p:spPr>
           <a:xfrm>
-            <a:off x="754386" y="6356397"/>
-            <a:ext cx="2468898" cy="365128"/>
+            <a:off x="754392" y="6016099"/>
+            <a:ext cx="2468916" cy="345580"/>
           </a:xfrm>
           <a:prstGeom prst="rect">
             <a:avLst/>
@@ -2225,7 +2225,7 @@
           <a:bodyPr vert="horz" lIns="91440" tIns="45720" rIns="91440" bIns="45720" rtlCol="0" anchor="ctr"/>
           <a:lstStyle>
             <a:lvl1pPr algn="l">
-              <a:defRPr sz="1200">
+              <a:defRPr sz="1135">
                 <a:solidFill>
                   <a:schemeClr val="tx1">
                     <a:tint val="75000"/>
@@ -2254,8 +2254,8 @@
         </p:nvSpPr>
         <p:spPr>
           <a:xfrm>
-            <a:off x="3634767" y="6356397"/>
-            <a:ext cx="3703347" cy="365128"/>
+            <a:off x="3634794" y="6016099"/>
+            <a:ext cx="3703374" cy="345580"/>
           </a:xfrm>
           <a:prstGeom prst="rect">
             <a:avLst/>
@@ -2265,7 +2265,7 @@
           <a:bodyPr vert="horz" lIns="91440" tIns="45720" rIns="91440" bIns="45720" rtlCol="0" anchor="ctr"/>
           <a:lstStyle>
             <a:lvl1pPr algn="ctr">
-              <a:defRPr sz="1200">
+              <a:defRPr sz="1135">
                 <a:solidFill>
                   <a:schemeClr val="tx1">
                     <a:tint val="75000"/>
@@ -2291,8 +2291,8 @@
         </p:nvSpPr>
         <p:spPr>
           <a:xfrm>
-            <a:off x="7749597" y="6356397"/>
-            <a:ext cx="2468898" cy="365128"/>
+            <a:off x="7749654" y="6016099"/>
+            <a:ext cx="2468916" cy="345580"/>
           </a:xfrm>
           <a:prstGeom prst="rect">
             <a:avLst/>
@@ -2302,7 +2302,7 @@
           <a:bodyPr vert="horz" lIns="91440" tIns="45720" rIns="91440" bIns="45720" rtlCol="0" anchor="ctr"/>
           <a:lstStyle>
             <a:lvl1pPr algn="r">
-              <a:defRPr sz="1200">
+              <a:defRPr sz="1135">
                 <a:solidFill>
                   <a:schemeClr val="tx1">
                     <a:tint val="75000"/>
@@ -2336,7 +2336,7 @@
   </p:sldLayoutIdLst>
   <p:txStyles>
     <p:titleStyle>
-      <a:lvl1pPr algn="l" defTabSz="914400" rtl="0" eaLnBrk="1" latinLnBrk="0" hangingPunct="1">
+      <a:lvl1pPr algn="l" defTabSz="865505" rtl="0" eaLnBrk="1" latinLnBrk="0" hangingPunct="1">
         <a:lnSpc>
           <a:spcPct val="90000"/>
         </a:lnSpc>
@@ -2344,7 +2344,7 @@
           <a:spcPct val="0"/>
         </a:spcBef>
         <a:buNone/>
-        <a:defRPr sz="4400" kern="1200">
+        <a:defRPr sz="4165" kern="1200">
           <a:solidFill>
             <a:schemeClr val="tx1"/>
           </a:solidFill>
@@ -2355,16 +2355,16 @@
       </a:lvl1pPr>
     </p:titleStyle>
     <p:bodyStyle>
-      <a:lvl1pPr marL="228600" indent="-228600" algn="l" defTabSz="914400" rtl="0" eaLnBrk="1" latinLnBrk="0" hangingPunct="1">
+      <a:lvl1pPr marL="216535" indent="-215900" algn="l" defTabSz="865505" rtl="0" eaLnBrk="1" latinLnBrk="0" hangingPunct="1">
         <a:lnSpc>
           <a:spcPct val="90000"/>
         </a:lnSpc>
         <a:spcBef>
-          <a:spcPts val="1000"/>
+          <a:spcPts val="945"/>
         </a:spcBef>
         <a:buFont typeface="Arial" panose="020B0604020202020204" pitchFamily="34" charset="0"/>
         <a:buChar char="•"/>
-        <a:defRPr sz="2800" kern="1200">
+        <a:defRPr sz="2650" kern="1200">
           <a:solidFill>
             <a:schemeClr val="tx1"/>
           </a:solidFill>
@@ -2373,16 +2373,16 @@
           <a:cs typeface="+mn-cs"/>
         </a:defRPr>
       </a:lvl1pPr>
-      <a:lvl2pPr marL="685800" indent="-228600" algn="l" defTabSz="914400" rtl="0" eaLnBrk="1" latinLnBrk="0" hangingPunct="1">
+      <a:lvl2pPr marL="648970" indent="-215900" algn="l" defTabSz="865505" rtl="0" eaLnBrk="1" latinLnBrk="0" hangingPunct="1">
         <a:lnSpc>
           <a:spcPct val="90000"/>
         </a:lnSpc>
         <a:spcBef>
-          <a:spcPts val="500"/>
+          <a:spcPct val="95000"/>
         </a:spcBef>
         <a:buFont typeface="Arial" panose="020B0604020202020204" pitchFamily="34" charset="0"/>
         <a:buChar char="•"/>
-        <a:defRPr sz="2400" kern="1200">
+        <a:defRPr sz="2270" kern="1200">
           <a:solidFill>
             <a:schemeClr val="tx1"/>
           </a:solidFill>
@@ -2391,16 +2391,16 @@
           <a:cs typeface="+mn-cs"/>
         </a:defRPr>
       </a:lvl2pPr>
-      <a:lvl3pPr marL="1143000" indent="-228600" algn="l" defTabSz="914400" rtl="0" eaLnBrk="1" latinLnBrk="0" hangingPunct="1">
+      <a:lvl3pPr marL="1082040" indent="-215900" algn="l" defTabSz="865505" rtl="0" eaLnBrk="1" latinLnBrk="0" hangingPunct="1">
         <a:lnSpc>
           <a:spcPct val="90000"/>
         </a:lnSpc>
         <a:spcBef>
-          <a:spcPts val="500"/>
+          <a:spcPct val="95000"/>
         </a:spcBef>
         <a:buFont typeface="Arial" panose="020B0604020202020204" pitchFamily="34" charset="0"/>
         <a:buChar char="•"/>
-        <a:defRPr sz="2000" kern="1200">
+        <a:defRPr sz="1895" kern="1200">
           <a:solidFill>
             <a:schemeClr val="tx1"/>
           </a:solidFill>
@@ -2409,16 +2409,16 @@
           <a:cs typeface="+mn-cs"/>
         </a:defRPr>
       </a:lvl3pPr>
-      <a:lvl4pPr marL="1600200" indent="-228600" algn="l" defTabSz="914400" rtl="0" eaLnBrk="1" latinLnBrk="0" hangingPunct="1">
+      <a:lvl4pPr marL="1514475" indent="-215900" algn="l" defTabSz="865505" rtl="0" eaLnBrk="1" latinLnBrk="0" hangingPunct="1">
         <a:lnSpc>
           <a:spcPct val="90000"/>
         </a:lnSpc>
         <a:spcBef>
-          <a:spcPts val="500"/>
+          <a:spcPct val="95000"/>
         </a:spcBef>
         <a:buFont typeface="Arial" panose="020B0604020202020204" pitchFamily="34" charset="0"/>
         <a:buChar char="•"/>
-        <a:defRPr sz="1800" kern="1200">
+        <a:defRPr sz="1705" kern="1200">
           <a:solidFill>
             <a:schemeClr val="tx1"/>
           </a:solidFill>
@@ -2427,16 +2427,16 @@
           <a:cs typeface="+mn-cs"/>
         </a:defRPr>
       </a:lvl4pPr>
-      <a:lvl5pPr marL="2057400" indent="-228600" algn="l" defTabSz="914400" rtl="0" eaLnBrk="1" latinLnBrk="0" hangingPunct="1">
+      <a:lvl5pPr marL="1947545" indent="-215900" algn="l" defTabSz="865505" rtl="0" eaLnBrk="1" latinLnBrk="0" hangingPunct="1">
         <a:lnSpc>
           <a:spcPct val="90000"/>
         </a:lnSpc>
         <a:spcBef>
-          <a:spcPts val="500"/>
+          <a:spcPct val="95000"/>
         </a:spcBef>
         <a:buFont typeface="Arial" panose="020B0604020202020204" pitchFamily="34" charset="0"/>
         <a:buChar char="•"/>
-        <a:defRPr sz="1800" kern="1200">
+        <a:defRPr sz="1705" kern="1200">
           <a:solidFill>
             <a:schemeClr val="tx1"/>
           </a:solidFill>
@@ -2445,16 +2445,16 @@
           <a:cs typeface="+mn-cs"/>
         </a:defRPr>
       </a:lvl5pPr>
-      <a:lvl6pPr marL="2514600" indent="-228600" algn="l" defTabSz="914400" rtl="0" eaLnBrk="1" latinLnBrk="0" hangingPunct="1">
+      <a:lvl6pPr marL="2379980" indent="-215900" algn="l" defTabSz="865505" rtl="0" eaLnBrk="1" latinLnBrk="0" hangingPunct="1">
         <a:lnSpc>
           <a:spcPct val="90000"/>
         </a:lnSpc>
         <a:spcBef>
-          <a:spcPts val="500"/>
+          <a:spcPct val="95000"/>
         </a:spcBef>
         <a:buFont typeface="Arial" panose="020B0604020202020204" pitchFamily="34" charset="0"/>
         <a:buChar char="•"/>
-        <a:defRPr sz="1800" kern="1200">
+        <a:defRPr sz="1705" kern="1200">
           <a:solidFill>
             <a:schemeClr val="tx1"/>
           </a:solidFill>
@@ -2463,16 +2463,16 @@
           <a:cs typeface="+mn-cs"/>
         </a:defRPr>
       </a:lvl6pPr>
-      <a:lvl7pPr marL="2971800" indent="-228600" algn="l" defTabSz="914400" rtl="0" eaLnBrk="1" latinLnBrk="0" hangingPunct="1">
+      <a:lvl7pPr marL="2812415" indent="-215900" algn="l" defTabSz="865505" rtl="0" eaLnBrk="1" latinLnBrk="0" hangingPunct="1">
         <a:lnSpc>
           <a:spcPct val="90000"/>
         </a:lnSpc>
         <a:spcBef>
-          <a:spcPts val="500"/>
+          <a:spcPct val="95000"/>
         </a:spcBef>
         <a:buFont typeface="Arial" panose="020B0604020202020204" pitchFamily="34" charset="0"/>
         <a:buChar char="•"/>
-        <a:defRPr sz="1800" kern="1200">
+        <a:defRPr sz="1705" kern="1200">
           <a:solidFill>
             <a:schemeClr val="tx1"/>
           </a:solidFill>
@@ -2481,16 +2481,16 @@
           <a:cs typeface="+mn-cs"/>
         </a:defRPr>
       </a:lvl7pPr>
-      <a:lvl8pPr marL="3429000" indent="-228600" algn="l" defTabSz="914400" rtl="0" eaLnBrk="1" latinLnBrk="0" hangingPunct="1">
+      <a:lvl8pPr marL="3245485" indent="-215900" algn="l" defTabSz="865505" rtl="0" eaLnBrk="1" latinLnBrk="0" hangingPunct="1">
         <a:lnSpc>
           <a:spcPct val="90000"/>
         </a:lnSpc>
         <a:spcBef>
-          <a:spcPts val="500"/>
+          <a:spcPct val="95000"/>
         </a:spcBef>
         <a:buFont typeface="Arial" panose="020B0604020202020204" pitchFamily="34" charset="0"/>
         <a:buChar char="•"/>
-        <a:defRPr sz="1800" kern="1200">
+        <a:defRPr sz="1705" kern="1200">
           <a:solidFill>
             <a:schemeClr val="tx1"/>
           </a:solidFill>
@@ -2499,16 +2499,16 @@
           <a:cs typeface="+mn-cs"/>
         </a:defRPr>
       </a:lvl8pPr>
-      <a:lvl9pPr marL="3886200" indent="-228600" algn="l" defTabSz="914400" rtl="0" eaLnBrk="1" latinLnBrk="0" hangingPunct="1">
+      <a:lvl9pPr marL="3677920" indent="-215900" algn="l" defTabSz="865505" rtl="0" eaLnBrk="1" latinLnBrk="0" hangingPunct="1">
         <a:lnSpc>
           <a:spcPct val="90000"/>
         </a:lnSpc>
         <a:spcBef>
-          <a:spcPts val="500"/>
+          <a:spcPct val="95000"/>
         </a:spcBef>
         <a:buFont typeface="Arial" panose="020B0604020202020204" pitchFamily="34" charset="0"/>
         <a:buChar char="•"/>
-        <a:defRPr sz="1800" kern="1200">
+        <a:defRPr sz="1705" kern="1200">
           <a:solidFill>
             <a:schemeClr val="tx1"/>
           </a:solidFill>
@@ -2522,8 +2522,8 @@
       <a:defPPr>
         <a:defRPr lang="en-US"/>
       </a:defPPr>
-      <a:lvl1pPr marL="0" algn="l" defTabSz="914400" rtl="0" eaLnBrk="1" latinLnBrk="0" hangingPunct="1">
-        <a:defRPr sz="1800" kern="1200">
+      <a:lvl1pPr marL="0" algn="l" defTabSz="865505" rtl="0" eaLnBrk="1" latinLnBrk="0" hangingPunct="1">
+        <a:defRPr sz="1705" kern="1200">
           <a:solidFill>
             <a:schemeClr val="tx1"/>
           </a:solidFill>
@@ -2532,8 +2532,8 @@
           <a:cs typeface="+mn-cs"/>
         </a:defRPr>
       </a:lvl1pPr>
-      <a:lvl2pPr marL="457200" algn="l" defTabSz="914400" rtl="0" eaLnBrk="1" latinLnBrk="0" hangingPunct="1">
-        <a:defRPr sz="1800" kern="1200">
+      <a:lvl2pPr marL="432435" algn="l" defTabSz="865505" rtl="0" eaLnBrk="1" latinLnBrk="0" hangingPunct="1">
+        <a:defRPr sz="1705" kern="1200">
           <a:solidFill>
             <a:schemeClr val="tx1"/>
           </a:solidFill>
@@ -2542,8 +2542,8 @@
           <a:cs typeface="+mn-cs"/>
         </a:defRPr>
       </a:lvl2pPr>
-      <a:lvl3pPr marL="914400" algn="l" defTabSz="914400" rtl="0" eaLnBrk="1" latinLnBrk="0" hangingPunct="1">
-        <a:defRPr sz="1800" kern="1200">
+      <a:lvl3pPr marL="865505" algn="l" defTabSz="865505" rtl="0" eaLnBrk="1" latinLnBrk="0" hangingPunct="1">
+        <a:defRPr sz="1705" kern="1200">
           <a:solidFill>
             <a:schemeClr val="tx1"/>
           </a:solidFill>
@@ -2552,8 +2552,8 @@
           <a:cs typeface="+mn-cs"/>
         </a:defRPr>
       </a:lvl3pPr>
-      <a:lvl4pPr marL="1371600" algn="l" defTabSz="914400" rtl="0" eaLnBrk="1" latinLnBrk="0" hangingPunct="1">
-        <a:defRPr sz="1800" kern="1200">
+      <a:lvl4pPr marL="1297940" algn="l" defTabSz="865505" rtl="0" eaLnBrk="1" latinLnBrk="0" hangingPunct="1">
+        <a:defRPr sz="1705" kern="1200">
           <a:solidFill>
             <a:schemeClr val="tx1"/>
           </a:solidFill>
@@ -2562,8 +2562,8 @@
           <a:cs typeface="+mn-cs"/>
         </a:defRPr>
       </a:lvl4pPr>
-      <a:lvl5pPr marL="1828800" algn="l" defTabSz="914400" rtl="0" eaLnBrk="1" latinLnBrk="0" hangingPunct="1">
-        <a:defRPr sz="1800" kern="1200">
+      <a:lvl5pPr marL="1731010" algn="l" defTabSz="865505" rtl="0" eaLnBrk="1" latinLnBrk="0" hangingPunct="1">
+        <a:defRPr sz="1705" kern="1200">
           <a:solidFill>
             <a:schemeClr val="tx1"/>
           </a:solidFill>
@@ -2572,8 +2572,8 @@
           <a:cs typeface="+mn-cs"/>
         </a:defRPr>
       </a:lvl5pPr>
-      <a:lvl6pPr marL="2286000" algn="l" defTabSz="914400" rtl="0" eaLnBrk="1" latinLnBrk="0" hangingPunct="1">
-        <a:defRPr sz="1800" kern="1200">
+      <a:lvl6pPr marL="2163445" algn="l" defTabSz="865505" rtl="0" eaLnBrk="1" latinLnBrk="0" hangingPunct="1">
+        <a:defRPr sz="1705" kern="1200">
           <a:solidFill>
             <a:schemeClr val="tx1"/>
           </a:solidFill>
@@ -2582,8 +2582,8 @@
           <a:cs typeface="+mn-cs"/>
         </a:defRPr>
       </a:lvl6pPr>
-      <a:lvl7pPr marL="2743200" algn="l" defTabSz="914400" rtl="0" eaLnBrk="1" latinLnBrk="0" hangingPunct="1">
-        <a:defRPr sz="1800" kern="1200">
+      <a:lvl7pPr marL="2596515" algn="l" defTabSz="865505" rtl="0" eaLnBrk="1" latinLnBrk="0" hangingPunct="1">
+        <a:defRPr sz="1705" kern="1200">
           <a:solidFill>
             <a:schemeClr val="tx1"/>
           </a:solidFill>
@@ -2592,8 +2592,8 @@
           <a:cs typeface="+mn-cs"/>
         </a:defRPr>
       </a:lvl7pPr>
-      <a:lvl8pPr marL="3200400" algn="l" defTabSz="914400" rtl="0" eaLnBrk="1" latinLnBrk="0" hangingPunct="1">
-        <a:defRPr sz="1800" kern="1200">
+      <a:lvl8pPr marL="3028950" algn="l" defTabSz="865505" rtl="0" eaLnBrk="1" latinLnBrk="0" hangingPunct="1">
+        <a:defRPr sz="1705" kern="1200">
           <a:solidFill>
             <a:schemeClr val="tx1"/>
           </a:solidFill>
@@ -2602,8 +2602,8 @@
           <a:cs typeface="+mn-cs"/>
         </a:defRPr>
       </a:lvl8pPr>
-      <a:lvl9pPr marL="3657600" algn="l" defTabSz="914400" rtl="0" eaLnBrk="1" latinLnBrk="0" hangingPunct="1">
-        <a:defRPr sz="1800" kern="1200">
+      <a:lvl9pPr marL="3462020" algn="l" defTabSz="865505" rtl="0" eaLnBrk="1" latinLnBrk="0" hangingPunct="1">
+        <a:defRPr sz="1705" kern="1200">
           <a:solidFill>
             <a:schemeClr val="tx1"/>
           </a:solidFill>
@@ -2634,7 +2634,7 @@
           <p:nvPr/>
         </p:nvGraphicFramePr>
         <p:xfrm>
-          <a:off x="635040" y="996340"/>
+          <a:off x="635080" y="812764"/>
           <a:ext cx="2761615" cy="5508625"/>
         </p:xfrm>
         <a:graphic>
@@ -2648,7 +2648,7 @@
                 <a:gridCol w="920115"/>
                 <a:gridCol w="920750"/>
               </a:tblGrid>
-              <a:tr h="582930">
+              <a:tr h="647065">
                 <a:tc>
                   <a:txBody>
                     <a:bodyPr/>
@@ -2702,7 +2702,7 @@
                   <a:tcPr/>
                 </a:tc>
               </a:tr>
-              <a:tr h="546735">
+              <a:tr h="607695">
                 <a:tc>
                   <a:txBody>
                     <a:bodyPr/>
@@ -2768,7 +2768,7 @@
                   <a:tcPr/>
                 </a:tc>
               </a:tr>
-              <a:tr h="548005">
+              <a:tr h="608330">
                 <a:tc>
                   <a:txBody>
                     <a:bodyPr/>
@@ -2846,7 +2846,7 @@
                   <a:tcPr/>
                 </a:tc>
               </a:tr>
-              <a:tr h="546735">
+              <a:tr h="607060">
                 <a:tc>
                   <a:txBody>
                     <a:bodyPr/>
@@ -2892,7 +2892,7 @@
                   <a:tcPr/>
                 </a:tc>
               </a:tr>
-              <a:tr h="548005">
+              <a:tr h="608330">
                 <a:tc>
                   <a:txBody>
                     <a:bodyPr/>
@@ -2938,7 +2938,7 @@
                   <a:tcPr/>
                 </a:tc>
               </a:tr>
-              <a:tr h="546735">
+              <a:tr h="607060">
                 <a:tc>
                   <a:txBody>
                     <a:bodyPr/>
@@ -2984,7 +2984,7 @@
                   <a:tcPr/>
                 </a:tc>
               </a:tr>
-              <a:tr h="548005">
+              <a:tr h="607695">
                 <a:tc>
                   <a:txBody>
                     <a:bodyPr/>
@@ -3030,7 +3030,7 @@
                   <a:tcPr/>
                 </a:tc>
               </a:tr>
-              <a:tr h="546735">
+              <a:tr h="608330">
                 <a:tc>
                   <a:txBody>
                     <a:bodyPr/>
@@ -3076,53 +3076,7 @@
                   <a:tcPr/>
                 </a:tc>
               </a:tr>
-              <a:tr h="548005">
-                <a:tc>
-                  <a:txBody>
-                    <a:bodyPr/>
-                    <a:p>
-                      <a:pPr algn="ctr">
-                        <a:buNone/>
-                      </a:pPr>
-                      <a:r>
-                        <a:rPr lang="en-US" sz="1800"/>
-                        <a:t>...</a:t>
-                      </a:r>
-                      <a:endParaRPr lang="en-US" sz="1800"/>
-                    </a:p>
-                  </a:txBody>
-                  <a:tcPr/>
-                </a:tc>
-                <a:tc>
-                  <a:txBody>
-                    <a:bodyPr/>
-                    <a:p>
-                      <a:pPr algn="ctr">
-                        <a:buNone/>
-                      </a:pPr>
-                      <a:r>
-                        <a:rPr lang="en-US" sz="1800"/>
-                        <a:t>...</a:t>
-                      </a:r>
-                      <a:endParaRPr lang="en-US" sz="1800"/>
-                    </a:p>
-                  </a:txBody>
-                  <a:tcPr/>
-                </a:tc>
-                <a:tc>
-                  <a:txBody>
-                    <a:bodyPr/>
-                    <a:p>
-                      <a:pPr>
-                        <a:buNone/>
-                      </a:pPr>
-                      <a:endParaRPr lang="en-US" sz="1800"/>
-                    </a:p>
-                  </a:txBody>
-                  <a:tcPr/>
-                </a:tc>
-              </a:tr>
-              <a:tr h="546735">
+              <a:tr h="607060">
                 <a:tc>
                   <a:txBody>
                     <a:bodyPr/>
@@ -3211,7 +3165,7 @@
           <p:nvPr/>
         </p:nvGraphicFramePr>
         <p:xfrm>
-          <a:off x="4131350" y="996340"/>
+          <a:off x="4131390" y="812764"/>
           <a:ext cx="2698115" cy="3282950"/>
         </p:xfrm>
         <a:graphic>
@@ -3632,7 +3586,7 @@
           <p:nvPr/>
         </p:nvGraphicFramePr>
         <p:xfrm>
-          <a:off x="7519075" y="996340"/>
+          <a:off x="7519115" y="812764"/>
           <a:ext cx="2734945" cy="2770505"/>
         </p:xfrm>
         <a:graphic>
@@ -3988,7 +3942,7 @@
         </p:nvSpPr>
         <p:spPr>
           <a:xfrm>
-            <a:off x="713740" y="440055"/>
+            <a:off x="674370" y="346710"/>
             <a:ext cx="2682875" cy="368300"/>
           </a:xfrm>
           <a:prstGeom prst="rect">
@@ -4017,7 +3971,7 @@
             </a:r>
             <a:r>
               <a:rPr lang="en-US"/>
-              <a:t>)=i</a:t>
+              <a:t>=i)</a:t>
             </a:r>
             <a:endParaRPr lang="en-US"/>
           </a:p>
@@ -4031,7 +3985,7 @@
         </p:nvSpPr>
         <p:spPr>
           <a:xfrm>
-            <a:off x="4131310" y="440055"/>
+            <a:off x="4131310" y="346710"/>
             <a:ext cx="2682875" cy="368300"/>
           </a:xfrm>
           <a:prstGeom prst="rect">
@@ -4070,7 +4024,7 @@
               <a:rPr lang="en-US">
                 <a:sym typeface="+mn-ea"/>
               </a:rPr>
-              <a:t>)=j</a:t>
+              <a:t>=j)</a:t>
             </a:r>
             <a:endParaRPr lang="en-US"/>
           </a:p>
@@ -4084,7 +4038,7 @@
         </p:nvSpPr>
         <p:spPr>
           <a:xfrm>
-            <a:off x="7519035" y="440055"/>
+            <a:off x="7519035" y="346710"/>
             <a:ext cx="2682875" cy="368300"/>
           </a:xfrm>
           <a:prstGeom prst="rect">
@@ -4123,7 +4077,7 @@
               <a:rPr lang="en-US">
                 <a:sym typeface="+mn-ea"/>
               </a:rPr>
-              <a:t>)=k</a:t>
+              <a:t>=k)</a:t>
             </a:r>
             <a:endParaRPr lang="en-US"/>
           </a:p>
@@ -4137,7 +4091,7 @@
         </p:nvCxnSpPr>
         <p:spPr>
           <a:xfrm>
-            <a:off x="2237145" y="1807870"/>
+            <a:off x="2237185" y="1624294"/>
             <a:ext cx="2099945" cy="0"/>
           </a:xfrm>
           <a:prstGeom prst="straightConnector1">
@@ -4170,7 +4124,7 @@
         </p:nvCxnSpPr>
         <p:spPr>
           <a:xfrm flipV="1">
-            <a:off x="5730915" y="1826920"/>
+            <a:off x="5730955" y="1643344"/>
             <a:ext cx="2020570" cy="8890"/>
           </a:xfrm>
           <a:prstGeom prst="straightConnector1">
@@ -4203,7 +4157,7 @@
         </p:nvCxnSpPr>
         <p:spPr>
           <a:xfrm>
-            <a:off x="2237145" y="2388895"/>
+            <a:off x="2237185" y="2205319"/>
             <a:ext cx="2099945" cy="0"/>
           </a:xfrm>
           <a:prstGeom prst="straightConnector1">
@@ -4236,7 +4190,7 @@
         </p:nvCxnSpPr>
         <p:spPr>
           <a:xfrm>
-            <a:off x="2237145" y="2956585"/>
+            <a:off x="2237185" y="2773009"/>
             <a:ext cx="2099945" cy="0"/>
           </a:xfrm>
           <a:prstGeom prst="straightConnector1">
@@ -4269,7 +4223,7 @@
         </p:nvCxnSpPr>
         <p:spPr>
           <a:xfrm>
-            <a:off x="5690910" y="2388895"/>
+            <a:off x="5690950" y="2205319"/>
             <a:ext cx="2099945" cy="0"/>
           </a:xfrm>
           <a:prstGeom prst="straightConnector1">

</xml_diff>